<commit_message>
Site updated: 2024-05-26 17:22:43
</commit_message>
<xml_diff>
--- a/img/pic.pptx
+++ b/img/pic.pptx
@@ -7,6 +7,8 @@
   <p:sldIdLst>
     <p:sldId id="256" r:id="rId2"/>
     <p:sldId id="257" r:id="rId3"/>
+    <p:sldId id="258" r:id="rId4"/>
+    <p:sldId id="259" r:id="rId5"/>
   </p:sldIdLst>
   <p:sldSz cx="12192000" cy="6858000"/>
   <p:notesSz cx="6858000" cy="9144000"/>
@@ -105,6 +107,11 @@
       </a:defRPr>
     </a:lvl9pPr>
   </p:defaultTextStyle>
+  <p:extLst>
+    <p:ext uri="{EFAFB233-063F-42B5-8137-9DF3F51BA10A}">
+      <p15:sldGuideLst xmlns:p15="http://schemas.microsoft.com/office/powerpoint/2012/main"/>
+    </p:ext>
+  </p:extLst>
 </p:presentation>
 </file>
 
@@ -255,7 +262,7 @@
           <a:p>
             <a:fld id="{58A749B2-B91D-4C1A-83E6-7AD02F774933}" type="datetimeFigureOut">
               <a:rPr lang="zh-CN" altLang="en-US" smtClean="0"/>
-              <a:t>2024/5/14</a:t>
+              <a:t>2024/5/26</a:t>
             </a:fld>
             <a:endParaRPr lang="zh-CN" altLang="en-US"/>
           </a:p>
@@ -453,7 +460,7 @@
           <a:p>
             <a:fld id="{58A749B2-B91D-4C1A-83E6-7AD02F774933}" type="datetimeFigureOut">
               <a:rPr lang="zh-CN" altLang="en-US" smtClean="0"/>
-              <a:t>2024/5/14</a:t>
+              <a:t>2024/5/26</a:t>
             </a:fld>
             <a:endParaRPr lang="zh-CN" altLang="en-US"/>
           </a:p>
@@ -661,7 +668,7 @@
           <a:p>
             <a:fld id="{58A749B2-B91D-4C1A-83E6-7AD02F774933}" type="datetimeFigureOut">
               <a:rPr lang="zh-CN" altLang="en-US" smtClean="0"/>
-              <a:t>2024/5/14</a:t>
+              <a:t>2024/5/26</a:t>
             </a:fld>
             <a:endParaRPr lang="zh-CN" altLang="en-US"/>
           </a:p>
@@ -859,7 +866,7 @@
           <a:p>
             <a:fld id="{58A749B2-B91D-4C1A-83E6-7AD02F774933}" type="datetimeFigureOut">
               <a:rPr lang="zh-CN" altLang="en-US" smtClean="0"/>
-              <a:t>2024/5/14</a:t>
+              <a:t>2024/5/26</a:t>
             </a:fld>
             <a:endParaRPr lang="zh-CN" altLang="en-US"/>
           </a:p>
@@ -1134,7 +1141,7 @@
           <a:p>
             <a:fld id="{58A749B2-B91D-4C1A-83E6-7AD02F774933}" type="datetimeFigureOut">
               <a:rPr lang="zh-CN" altLang="en-US" smtClean="0"/>
-              <a:t>2024/5/14</a:t>
+              <a:t>2024/5/26</a:t>
             </a:fld>
             <a:endParaRPr lang="zh-CN" altLang="en-US"/>
           </a:p>
@@ -1399,7 +1406,7 @@
           <a:p>
             <a:fld id="{58A749B2-B91D-4C1A-83E6-7AD02F774933}" type="datetimeFigureOut">
               <a:rPr lang="zh-CN" altLang="en-US" smtClean="0"/>
-              <a:t>2024/5/14</a:t>
+              <a:t>2024/5/26</a:t>
             </a:fld>
             <a:endParaRPr lang="zh-CN" altLang="en-US"/>
           </a:p>
@@ -1811,7 +1818,7 @@
           <a:p>
             <a:fld id="{58A749B2-B91D-4C1A-83E6-7AD02F774933}" type="datetimeFigureOut">
               <a:rPr lang="zh-CN" altLang="en-US" smtClean="0"/>
-              <a:t>2024/5/14</a:t>
+              <a:t>2024/5/26</a:t>
             </a:fld>
             <a:endParaRPr lang="zh-CN" altLang="en-US"/>
           </a:p>
@@ -1952,7 +1959,7 @@
           <a:p>
             <a:fld id="{58A749B2-B91D-4C1A-83E6-7AD02F774933}" type="datetimeFigureOut">
               <a:rPr lang="zh-CN" altLang="en-US" smtClean="0"/>
-              <a:t>2024/5/14</a:t>
+              <a:t>2024/5/26</a:t>
             </a:fld>
             <a:endParaRPr lang="zh-CN" altLang="en-US"/>
           </a:p>
@@ -2065,7 +2072,7 @@
           <a:p>
             <a:fld id="{58A749B2-B91D-4C1A-83E6-7AD02F774933}" type="datetimeFigureOut">
               <a:rPr lang="zh-CN" altLang="en-US" smtClean="0"/>
-              <a:t>2024/5/14</a:t>
+              <a:t>2024/5/26</a:t>
             </a:fld>
             <a:endParaRPr lang="zh-CN" altLang="en-US"/>
           </a:p>
@@ -2376,7 +2383,7 @@
           <a:p>
             <a:fld id="{58A749B2-B91D-4C1A-83E6-7AD02F774933}" type="datetimeFigureOut">
               <a:rPr lang="zh-CN" altLang="en-US" smtClean="0"/>
-              <a:t>2024/5/14</a:t>
+              <a:t>2024/5/26</a:t>
             </a:fld>
             <a:endParaRPr lang="zh-CN" altLang="en-US"/>
           </a:p>
@@ -2664,7 +2671,7 @@
           <a:p>
             <a:fld id="{58A749B2-B91D-4C1A-83E6-7AD02F774933}" type="datetimeFigureOut">
               <a:rPr lang="zh-CN" altLang="en-US" smtClean="0"/>
-              <a:t>2024/5/14</a:t>
+              <a:t>2024/5/26</a:t>
             </a:fld>
             <a:endParaRPr lang="zh-CN" altLang="en-US"/>
           </a:p>
@@ -2905,7 +2912,7 @@
           <a:p>
             <a:fld id="{58A749B2-B91D-4C1A-83E6-7AD02F774933}" type="datetimeFigureOut">
               <a:rPr lang="zh-CN" altLang="en-US" smtClean="0"/>
-              <a:t>2024/5/14</a:t>
+              <a:t>2024/5/26</a:t>
             </a:fld>
             <a:endParaRPr lang="zh-CN" altLang="en-US"/>
           </a:p>
@@ -3698,6 +3705,515 @@
 </p:sld>
 </file>
 
+<file path=ppt/slides/slide3.xml><?xml version="1.0" encoding="utf-8"?>
+<p:sld xmlns:a="http://schemas.openxmlformats.org/drawingml/2006/main" xmlns:r="http://schemas.openxmlformats.org/officeDocument/2006/relationships" xmlns:p="http://schemas.openxmlformats.org/presentationml/2006/main">
+  <p:cSld>
+    <p:spTree>
+      <p:nvGrpSpPr>
+        <p:cNvPr id="1" name=""/>
+        <p:cNvGrpSpPr/>
+        <p:nvPr/>
+      </p:nvGrpSpPr>
+      <p:grpSpPr>
+        <a:xfrm>
+          <a:off x="0" y="0"/>
+          <a:ext cx="0" cy="0"/>
+          <a:chOff x="0" y="0"/>
+          <a:chExt cx="0" cy="0"/>
+        </a:xfrm>
+      </p:grpSpPr>
+      <p:pic>
+        <p:nvPicPr>
+          <p:cNvPr id="2" name="图片 1">
+            <a:extLst>
+              <a:ext uri="{FF2B5EF4-FFF2-40B4-BE49-F238E27FC236}">
+                <a16:creationId xmlns:a16="http://schemas.microsoft.com/office/drawing/2014/main" id="{18307BB2-8510-23D6-2FF7-2913C9E5358A}"/>
+              </a:ext>
+            </a:extLst>
+          </p:cNvPr>
+          <p:cNvPicPr>
+            <a:picLocks noChangeAspect="1"/>
+          </p:cNvPicPr>
+          <p:nvPr/>
+        </p:nvPicPr>
+        <p:blipFill>
+          <a:blip r:embed="rId2">
+            <a:extLst>
+              <a:ext uri="{28A0092B-C50C-407E-A947-70E740481C1C}">
+                <a14:useLocalDpi xmlns:a14="http://schemas.microsoft.com/office/drawing/2010/main" val="0"/>
+              </a:ext>
+            </a:extLst>
+          </a:blip>
+          <a:stretch>
+            <a:fillRect/>
+          </a:stretch>
+        </p:blipFill>
+        <p:spPr>
+          <a:xfrm>
+            <a:off x="1649691" y="966606"/>
+            <a:ext cx="5581385" cy="3139529"/>
+          </a:xfrm>
+          <a:prstGeom prst="rect">
+            <a:avLst/>
+          </a:prstGeom>
+          <a:effectLst>
+            <a:reflection endPos="0" dist="50800" dir="5400000" sy="-100000" algn="bl" rotWithShape="0"/>
+          </a:effectLst>
+        </p:spPr>
+      </p:pic>
+      <p:pic>
+        <p:nvPicPr>
+          <p:cNvPr id="3" name="图片 2">
+            <a:extLst>
+              <a:ext uri="{FF2B5EF4-FFF2-40B4-BE49-F238E27FC236}">
+                <a16:creationId xmlns:a16="http://schemas.microsoft.com/office/drawing/2014/main" id="{5F39A048-5F64-38B5-51DA-55E7151EC42B}"/>
+              </a:ext>
+            </a:extLst>
+          </p:cNvPr>
+          <p:cNvPicPr>
+            <a:picLocks noChangeAspect="1"/>
+          </p:cNvPicPr>
+          <p:nvPr/>
+        </p:nvPicPr>
+        <p:blipFill>
+          <a:blip r:embed="rId3"/>
+          <a:stretch>
+            <a:fillRect/>
+          </a:stretch>
+        </p:blipFill>
+        <p:spPr>
+          <a:xfrm>
+            <a:off x="8263045" y="1829135"/>
+            <a:ext cx="1471623" cy="1414473"/>
+          </a:xfrm>
+          <a:prstGeom prst="rect">
+            <a:avLst/>
+          </a:prstGeom>
+        </p:spPr>
+      </p:pic>
+      <p:pic>
+        <p:nvPicPr>
+          <p:cNvPr id="4" name="图片 3">
+            <a:extLst>
+              <a:ext uri="{FF2B5EF4-FFF2-40B4-BE49-F238E27FC236}">
+                <a16:creationId xmlns:a16="http://schemas.microsoft.com/office/drawing/2014/main" id="{3E0C5581-ED1C-5AE7-071F-E94B7AB69402}"/>
+              </a:ext>
+            </a:extLst>
+          </p:cNvPr>
+          <p:cNvPicPr>
+            <a:picLocks noChangeAspect="1"/>
+          </p:cNvPicPr>
+          <p:nvPr/>
+        </p:nvPicPr>
+        <p:blipFill>
+          <a:blip r:embed="rId2">
+            <a:extLst>
+              <a:ext uri="{28A0092B-C50C-407E-A947-70E740481C1C}">
+                <a14:useLocalDpi xmlns:a14="http://schemas.microsoft.com/office/drawing/2010/main" val="0"/>
+              </a:ext>
+            </a:extLst>
+          </a:blip>
+          <a:stretch>
+            <a:fillRect/>
+          </a:stretch>
+        </p:blipFill>
+        <p:spPr>
+          <a:xfrm>
+            <a:off x="1074418" y="4372206"/>
+            <a:ext cx="7106672" cy="3743181"/>
+          </a:xfrm>
+          <a:prstGeom prst="rect">
+            <a:avLst/>
+          </a:prstGeom>
+          <a:effectLst>
+            <a:reflection endPos="0" dist="50800" dir="5400000" sy="-100000" algn="bl" rotWithShape="0"/>
+          </a:effectLst>
+        </p:spPr>
+      </p:pic>
+      <p:sp>
+        <p:nvSpPr>
+          <p:cNvPr id="6" name="矩形 5">
+            <a:extLst>
+              <a:ext uri="{FF2B5EF4-FFF2-40B4-BE49-F238E27FC236}">
+                <a16:creationId xmlns:a16="http://schemas.microsoft.com/office/drawing/2014/main" id="{4E58FB89-5202-0383-E3B9-99B492940378}"/>
+              </a:ext>
+            </a:extLst>
+          </p:cNvPr>
+          <p:cNvSpPr/>
+          <p:nvPr/>
+        </p:nvSpPr>
+        <p:spPr>
+          <a:xfrm>
+            <a:off x="7320557" y="2132671"/>
+            <a:ext cx="5032148" cy="1569660"/>
+          </a:xfrm>
+          <a:prstGeom prst="rect">
+            <a:avLst/>
+          </a:prstGeom>
+          <a:noFill/>
+        </p:spPr>
+        <p:txBody>
+          <a:bodyPr wrap="none" lIns="91440" tIns="45720" rIns="91440" bIns="45720">
+            <a:spAutoFit/>
+          </a:bodyPr>
+          <a:lstStyle/>
+          <a:p>
+            <a:pPr algn="ctr"/>
+            <a:r>
+              <a:rPr lang="en-US" altLang="zh-CN" sz="9600" dirty="0">
+                <a:ln w="0"/>
+                <a:solidFill>
+                  <a:schemeClr val="bg1"/>
+                </a:solidFill>
+                <a:effectLst>
+                  <a:outerShdw blurRad="38100" dist="19050" dir="2700000" algn="tl" rotWithShape="0">
+                    <a:schemeClr val="dk1">
+                      <a:alpha val="40000"/>
+                    </a:schemeClr>
+                  </a:outerShdw>
+                </a:effectLst>
+                <a:latin typeface="华文行楷" panose="02010800040101010101" pitchFamily="2" charset="-122"/>
+                <a:ea typeface="华文行楷" panose="02010800040101010101" pitchFamily="2" charset="-122"/>
+              </a:rPr>
+              <a:t>C++</a:t>
+            </a:r>
+            <a:r>
+              <a:rPr lang="zh-CN" altLang="en-US" sz="9600" dirty="0">
+                <a:ln w="0"/>
+                <a:solidFill>
+                  <a:schemeClr val="bg1"/>
+                </a:solidFill>
+                <a:effectLst>
+                  <a:outerShdw blurRad="38100" dist="19050" dir="2700000" algn="tl" rotWithShape="0">
+                    <a:schemeClr val="dk1">
+                      <a:alpha val="40000"/>
+                    </a:schemeClr>
+                  </a:outerShdw>
+                </a:effectLst>
+                <a:latin typeface="华文行楷" panose="02010800040101010101" pitchFamily="2" charset="-122"/>
+                <a:ea typeface="华文行楷" panose="02010800040101010101" pitchFamily="2" charset="-122"/>
+              </a:rPr>
+              <a:t>学习</a:t>
+            </a:r>
+            <a:endParaRPr lang="zh-CN" altLang="en-US" sz="9600" b="0" cap="none" spc="0" dirty="0">
+              <a:ln w="0"/>
+              <a:solidFill>
+                <a:schemeClr val="bg1"/>
+              </a:solidFill>
+              <a:effectLst>
+                <a:outerShdw blurRad="38100" dist="19050" dir="2700000" algn="tl" rotWithShape="0">
+                  <a:schemeClr val="dk1">
+                    <a:alpha val="40000"/>
+                  </a:schemeClr>
+                </a:outerShdw>
+              </a:effectLst>
+              <a:latin typeface="华文行楷" panose="02010800040101010101" pitchFamily="2" charset="-122"/>
+              <a:ea typeface="华文行楷" panose="02010800040101010101" pitchFamily="2" charset="-122"/>
+            </a:endParaRPr>
+          </a:p>
+        </p:txBody>
+      </p:sp>
+      <p:sp>
+        <p:nvSpPr>
+          <p:cNvPr id="7" name="矩形 6">
+            <a:extLst>
+              <a:ext uri="{FF2B5EF4-FFF2-40B4-BE49-F238E27FC236}">
+                <a16:creationId xmlns:a16="http://schemas.microsoft.com/office/drawing/2014/main" id="{9DFC419B-8D50-3186-7E8A-B82DF77C24C2}"/>
+              </a:ext>
+            </a:extLst>
+          </p:cNvPr>
+          <p:cNvSpPr/>
+          <p:nvPr/>
+        </p:nvSpPr>
+        <p:spPr>
+          <a:xfrm>
+            <a:off x="971814" y="4727097"/>
+            <a:ext cx="7109639" cy="1015663"/>
+          </a:xfrm>
+          <a:prstGeom prst="rect">
+            <a:avLst/>
+          </a:prstGeom>
+          <a:noFill/>
+        </p:spPr>
+        <p:txBody>
+          <a:bodyPr wrap="none" lIns="91440" tIns="45720" rIns="91440" bIns="45720">
+            <a:spAutoFit/>
+          </a:bodyPr>
+          <a:lstStyle/>
+          <a:p>
+            <a:pPr algn="ctr"/>
+            <a:r>
+              <a:rPr lang="zh-CN" altLang="en-US" sz="6000" dirty="0">
+                <a:ln w="0"/>
+                <a:solidFill>
+                  <a:schemeClr val="bg1"/>
+                </a:solidFill>
+                <a:effectLst>
+                  <a:outerShdw blurRad="38100" dist="19050" dir="2700000" algn="tl" rotWithShape="0">
+                    <a:schemeClr val="dk1">
+                      <a:alpha val="40000"/>
+                    </a:schemeClr>
+                  </a:outerShdw>
+                </a:effectLst>
+                <a:latin typeface="华文行楷" panose="02010800040101010101" pitchFamily="2" charset="-122"/>
+                <a:ea typeface="华文行楷" panose="02010800040101010101" pitchFamily="2" charset="-122"/>
+              </a:rPr>
+              <a:t>因子图优化相关问题</a:t>
+            </a:r>
+            <a:endParaRPr lang="zh-CN" altLang="en-US" sz="6000" b="0" cap="none" spc="0" dirty="0">
+              <a:ln w="0"/>
+              <a:solidFill>
+                <a:schemeClr val="bg1"/>
+              </a:solidFill>
+              <a:effectLst>
+                <a:outerShdw blurRad="38100" dist="19050" dir="2700000" algn="tl" rotWithShape="0">
+                  <a:schemeClr val="dk1">
+                    <a:alpha val="40000"/>
+                  </a:schemeClr>
+                </a:outerShdw>
+              </a:effectLst>
+              <a:latin typeface="华文行楷" panose="02010800040101010101" pitchFamily="2" charset="-122"/>
+              <a:ea typeface="华文行楷" panose="02010800040101010101" pitchFamily="2" charset="-122"/>
+            </a:endParaRPr>
+          </a:p>
+        </p:txBody>
+      </p:sp>
+      <p:pic>
+        <p:nvPicPr>
+          <p:cNvPr id="5" name="图片 4">
+            <a:extLst>
+              <a:ext uri="{FF2B5EF4-FFF2-40B4-BE49-F238E27FC236}">
+                <a16:creationId xmlns:a16="http://schemas.microsoft.com/office/drawing/2014/main" id="{6176AF20-7AED-6942-370D-59501BBD8954}"/>
+              </a:ext>
+            </a:extLst>
+          </p:cNvPr>
+          <p:cNvPicPr>
+            <a:picLocks noChangeAspect="1"/>
+          </p:cNvPicPr>
+          <p:nvPr/>
+        </p:nvPicPr>
+        <p:blipFill>
+          <a:blip r:embed="rId4"/>
+          <a:stretch>
+            <a:fillRect/>
+          </a:stretch>
+        </p:blipFill>
+        <p:spPr>
+          <a:xfrm>
+            <a:off x="1451725" y="1078270"/>
+            <a:ext cx="5295939" cy="3976717"/>
+          </a:xfrm>
+          <a:prstGeom prst="rect">
+            <a:avLst/>
+          </a:prstGeom>
+        </p:spPr>
+      </p:pic>
+      <p:sp>
+        <p:nvSpPr>
+          <p:cNvPr id="8" name="矩形 7">
+            <a:extLst>
+              <a:ext uri="{FF2B5EF4-FFF2-40B4-BE49-F238E27FC236}">
+                <a16:creationId xmlns:a16="http://schemas.microsoft.com/office/drawing/2014/main" id="{C1A0DEB2-34EA-3B5E-A988-CA7490DBF046}"/>
+              </a:ext>
+            </a:extLst>
+          </p:cNvPr>
+          <p:cNvSpPr/>
+          <p:nvPr/>
+        </p:nvSpPr>
+        <p:spPr>
+          <a:xfrm>
+            <a:off x="1935136" y="1999579"/>
+            <a:ext cx="5032148" cy="1569660"/>
+          </a:xfrm>
+          <a:prstGeom prst="rect">
+            <a:avLst/>
+          </a:prstGeom>
+          <a:noFill/>
+        </p:spPr>
+        <p:txBody>
+          <a:bodyPr wrap="none" lIns="91440" tIns="45720" rIns="91440" bIns="45720">
+            <a:spAutoFit/>
+          </a:bodyPr>
+          <a:lstStyle/>
+          <a:p>
+            <a:pPr algn="ctr"/>
+            <a:r>
+              <a:rPr lang="en-US" altLang="zh-CN" sz="9600" dirty="0">
+                <a:ln w="0"/>
+                <a:solidFill>
+                  <a:schemeClr val="bg1"/>
+                </a:solidFill>
+                <a:effectLst>
+                  <a:outerShdw blurRad="38100" dist="19050" dir="2700000" algn="tl" rotWithShape="0">
+                    <a:schemeClr val="dk1">
+                      <a:alpha val="40000"/>
+                    </a:schemeClr>
+                  </a:outerShdw>
+                </a:effectLst>
+                <a:latin typeface="华文行楷" panose="02010800040101010101" pitchFamily="2" charset="-122"/>
+                <a:ea typeface="华文行楷" panose="02010800040101010101" pitchFamily="2" charset="-122"/>
+              </a:rPr>
+              <a:t>C++</a:t>
+            </a:r>
+            <a:r>
+              <a:rPr lang="zh-CN" altLang="en-US" sz="9600" dirty="0">
+                <a:ln w="0"/>
+                <a:solidFill>
+                  <a:schemeClr val="bg1"/>
+                </a:solidFill>
+                <a:effectLst>
+                  <a:outerShdw blurRad="38100" dist="19050" dir="2700000" algn="tl" rotWithShape="0">
+                    <a:schemeClr val="dk1">
+                      <a:alpha val="40000"/>
+                    </a:schemeClr>
+                  </a:outerShdw>
+                </a:effectLst>
+                <a:latin typeface="华文行楷" panose="02010800040101010101" pitchFamily="2" charset="-122"/>
+                <a:ea typeface="华文行楷" panose="02010800040101010101" pitchFamily="2" charset="-122"/>
+              </a:rPr>
+              <a:t>学习</a:t>
+            </a:r>
+            <a:endParaRPr lang="zh-CN" altLang="en-US" sz="9600" b="0" cap="none" spc="0" dirty="0">
+              <a:ln w="0"/>
+              <a:solidFill>
+                <a:schemeClr val="bg1"/>
+              </a:solidFill>
+              <a:effectLst>
+                <a:outerShdw blurRad="38100" dist="19050" dir="2700000" algn="tl" rotWithShape="0">
+                  <a:schemeClr val="dk1">
+                    <a:alpha val="40000"/>
+                  </a:schemeClr>
+                </a:outerShdw>
+              </a:effectLst>
+              <a:latin typeface="华文行楷" panose="02010800040101010101" pitchFamily="2" charset="-122"/>
+              <a:ea typeface="华文行楷" panose="02010800040101010101" pitchFamily="2" charset="-122"/>
+            </a:endParaRPr>
+          </a:p>
+        </p:txBody>
+      </p:sp>
+    </p:spTree>
+    <p:extLst>
+      <p:ext uri="{BB962C8B-B14F-4D97-AF65-F5344CB8AC3E}">
+        <p14:creationId xmlns:p14="http://schemas.microsoft.com/office/powerpoint/2010/main" val="3818139286"/>
+      </p:ext>
+    </p:extLst>
+  </p:cSld>
+  <p:clrMapOvr>
+    <a:masterClrMapping/>
+  </p:clrMapOvr>
+</p:sld>
+</file>
+
+<file path=ppt/slides/slide4.xml><?xml version="1.0" encoding="utf-8"?>
+<p:sld xmlns:a="http://schemas.openxmlformats.org/drawingml/2006/main" xmlns:r="http://schemas.openxmlformats.org/officeDocument/2006/relationships" xmlns:p="http://schemas.openxmlformats.org/presentationml/2006/main">
+  <p:cSld>
+    <p:spTree>
+      <p:nvGrpSpPr>
+        <p:cNvPr id="1" name=""/>
+        <p:cNvGrpSpPr/>
+        <p:nvPr/>
+      </p:nvGrpSpPr>
+      <p:grpSpPr>
+        <a:xfrm>
+          <a:off x="0" y="0"/>
+          <a:ext cx="0" cy="0"/>
+          <a:chOff x="0" y="0"/>
+          <a:chExt cx="0" cy="0"/>
+        </a:xfrm>
+      </p:grpSpPr>
+      <p:pic>
+        <p:nvPicPr>
+          <p:cNvPr id="4" name="图片 3">
+            <a:extLst>
+              <a:ext uri="{FF2B5EF4-FFF2-40B4-BE49-F238E27FC236}">
+                <a16:creationId xmlns:a16="http://schemas.microsoft.com/office/drawing/2014/main" id="{1A782AC0-43C4-AC14-E7D9-02DC59E93AE1}"/>
+              </a:ext>
+            </a:extLst>
+          </p:cNvPr>
+          <p:cNvPicPr>
+            <a:picLocks noChangeAspect="1"/>
+          </p:cNvPicPr>
+          <p:nvPr/>
+        </p:nvPicPr>
+        <p:blipFill>
+          <a:blip r:embed="rId2"/>
+          <a:stretch>
+            <a:fillRect/>
+          </a:stretch>
+        </p:blipFill>
+        <p:spPr>
+          <a:xfrm>
+            <a:off x="2509213" y="1199565"/>
+            <a:ext cx="6634786" cy="4878180"/>
+          </a:xfrm>
+          <a:prstGeom prst="rect">
+            <a:avLst/>
+          </a:prstGeom>
+        </p:spPr>
+      </p:pic>
+      <p:sp>
+        <p:nvSpPr>
+          <p:cNvPr id="5" name="矩形 4">
+            <a:extLst>
+              <a:ext uri="{FF2B5EF4-FFF2-40B4-BE49-F238E27FC236}">
+                <a16:creationId xmlns:a16="http://schemas.microsoft.com/office/drawing/2014/main" id="{5133D3C1-5EC9-B360-36E9-0F29F16A3DD9}"/>
+              </a:ext>
+            </a:extLst>
+          </p:cNvPr>
+          <p:cNvSpPr/>
+          <p:nvPr/>
+        </p:nvSpPr>
+        <p:spPr>
+          <a:xfrm>
+            <a:off x="5158105" y="4042721"/>
+            <a:ext cx="2262158" cy="923330"/>
+          </a:xfrm>
+          <a:prstGeom prst="rect">
+            <a:avLst/>
+          </a:prstGeom>
+          <a:noFill/>
+        </p:spPr>
+        <p:txBody>
+          <a:bodyPr wrap="none" lIns="91440" tIns="45720" rIns="91440" bIns="45720">
+            <a:spAutoFit/>
+          </a:bodyPr>
+          <a:lstStyle/>
+          <a:p>
+            <a:pPr algn="ctr"/>
+            <a:r>
+              <a:rPr lang="zh-CN" altLang="en-US" sz="5400" b="0" cap="none" spc="0" dirty="0">
+                <a:ln w="0"/>
+                <a:solidFill>
+                  <a:schemeClr val="tx1"/>
+                </a:solidFill>
+                <a:effectLst>
+                  <a:outerShdw blurRad="38100" dist="19050" dir="2700000" algn="tl" rotWithShape="0">
+                    <a:schemeClr val="dk1">
+                      <a:alpha val="40000"/>
+                    </a:schemeClr>
+                  </a:outerShdw>
+                </a:effectLst>
+                <a:latin typeface="华文行楷" panose="02010800040101010101" pitchFamily="2" charset="-122"/>
+                <a:ea typeface="华文行楷" panose="02010800040101010101" pitchFamily="2" charset="-122"/>
+              </a:rPr>
+              <a:t>碎碎念</a:t>
+            </a:r>
+          </a:p>
+        </p:txBody>
+      </p:sp>
+    </p:spTree>
+    <p:extLst>
+      <p:ext uri="{BB962C8B-B14F-4D97-AF65-F5344CB8AC3E}">
+        <p14:creationId xmlns:p14="http://schemas.microsoft.com/office/powerpoint/2010/main" val="3264562608"/>
+      </p:ext>
+    </p:extLst>
+  </p:cSld>
+  <p:clrMapOvr>
+    <a:masterClrMapping/>
+  </p:clrMapOvr>
+</p:sld>
+</file>
+
 <file path=ppt/theme/theme1.xml><?xml version="1.0" encoding="utf-8"?>
 <a:theme xmlns:a="http://schemas.openxmlformats.org/drawingml/2006/main" name="Office 主题​​">
   <a:themeElements>

</xml_diff>

<commit_message>
Site updated: 2024-05-27 15:18:13
</commit_message>
<xml_diff>
--- a/img/pic.pptx
+++ b/img/pic.pptx
@@ -9,6 +9,7 @@
     <p:sldId id="257" r:id="rId3"/>
     <p:sldId id="258" r:id="rId4"/>
     <p:sldId id="259" r:id="rId5"/>
+    <p:sldId id="260" r:id="rId6"/>
   </p:sldIdLst>
   <p:sldSz cx="12192000" cy="6858000"/>
   <p:notesSz cx="6858000" cy="9144000"/>
@@ -262,7 +263,7 @@
           <a:p>
             <a:fld id="{58A749B2-B91D-4C1A-83E6-7AD02F774933}" type="datetimeFigureOut">
               <a:rPr lang="zh-CN" altLang="en-US" smtClean="0"/>
-              <a:t>2024/5/26</a:t>
+              <a:t>2024/5/27</a:t>
             </a:fld>
             <a:endParaRPr lang="zh-CN" altLang="en-US"/>
           </a:p>
@@ -460,7 +461,7 @@
           <a:p>
             <a:fld id="{58A749B2-B91D-4C1A-83E6-7AD02F774933}" type="datetimeFigureOut">
               <a:rPr lang="zh-CN" altLang="en-US" smtClean="0"/>
-              <a:t>2024/5/26</a:t>
+              <a:t>2024/5/27</a:t>
             </a:fld>
             <a:endParaRPr lang="zh-CN" altLang="en-US"/>
           </a:p>
@@ -668,7 +669,7 @@
           <a:p>
             <a:fld id="{58A749B2-B91D-4C1A-83E6-7AD02F774933}" type="datetimeFigureOut">
               <a:rPr lang="zh-CN" altLang="en-US" smtClean="0"/>
-              <a:t>2024/5/26</a:t>
+              <a:t>2024/5/27</a:t>
             </a:fld>
             <a:endParaRPr lang="zh-CN" altLang="en-US"/>
           </a:p>
@@ -866,7 +867,7 @@
           <a:p>
             <a:fld id="{58A749B2-B91D-4C1A-83E6-7AD02F774933}" type="datetimeFigureOut">
               <a:rPr lang="zh-CN" altLang="en-US" smtClean="0"/>
-              <a:t>2024/5/26</a:t>
+              <a:t>2024/5/27</a:t>
             </a:fld>
             <a:endParaRPr lang="zh-CN" altLang="en-US"/>
           </a:p>
@@ -1141,7 +1142,7 @@
           <a:p>
             <a:fld id="{58A749B2-B91D-4C1A-83E6-7AD02F774933}" type="datetimeFigureOut">
               <a:rPr lang="zh-CN" altLang="en-US" smtClean="0"/>
-              <a:t>2024/5/26</a:t>
+              <a:t>2024/5/27</a:t>
             </a:fld>
             <a:endParaRPr lang="zh-CN" altLang="en-US"/>
           </a:p>
@@ -1406,7 +1407,7 @@
           <a:p>
             <a:fld id="{58A749B2-B91D-4C1A-83E6-7AD02F774933}" type="datetimeFigureOut">
               <a:rPr lang="zh-CN" altLang="en-US" smtClean="0"/>
-              <a:t>2024/5/26</a:t>
+              <a:t>2024/5/27</a:t>
             </a:fld>
             <a:endParaRPr lang="zh-CN" altLang="en-US"/>
           </a:p>
@@ -1818,7 +1819,7 @@
           <a:p>
             <a:fld id="{58A749B2-B91D-4C1A-83E6-7AD02F774933}" type="datetimeFigureOut">
               <a:rPr lang="zh-CN" altLang="en-US" smtClean="0"/>
-              <a:t>2024/5/26</a:t>
+              <a:t>2024/5/27</a:t>
             </a:fld>
             <a:endParaRPr lang="zh-CN" altLang="en-US"/>
           </a:p>
@@ -1959,7 +1960,7 @@
           <a:p>
             <a:fld id="{58A749B2-B91D-4C1A-83E6-7AD02F774933}" type="datetimeFigureOut">
               <a:rPr lang="zh-CN" altLang="en-US" smtClean="0"/>
-              <a:t>2024/5/26</a:t>
+              <a:t>2024/5/27</a:t>
             </a:fld>
             <a:endParaRPr lang="zh-CN" altLang="en-US"/>
           </a:p>
@@ -2072,7 +2073,7 @@
           <a:p>
             <a:fld id="{58A749B2-B91D-4C1A-83E6-7AD02F774933}" type="datetimeFigureOut">
               <a:rPr lang="zh-CN" altLang="en-US" smtClean="0"/>
-              <a:t>2024/5/26</a:t>
+              <a:t>2024/5/27</a:t>
             </a:fld>
             <a:endParaRPr lang="zh-CN" altLang="en-US"/>
           </a:p>
@@ -2383,7 +2384,7 @@
           <a:p>
             <a:fld id="{58A749B2-B91D-4C1A-83E6-7AD02F774933}" type="datetimeFigureOut">
               <a:rPr lang="zh-CN" altLang="en-US" smtClean="0"/>
-              <a:t>2024/5/26</a:t>
+              <a:t>2024/5/27</a:t>
             </a:fld>
             <a:endParaRPr lang="zh-CN" altLang="en-US"/>
           </a:p>
@@ -2671,7 +2672,7 @@
           <a:p>
             <a:fld id="{58A749B2-B91D-4C1A-83E6-7AD02F774933}" type="datetimeFigureOut">
               <a:rPr lang="zh-CN" altLang="en-US" smtClean="0"/>
-              <a:t>2024/5/26</a:t>
+              <a:t>2024/5/27</a:t>
             </a:fld>
             <a:endParaRPr lang="zh-CN" altLang="en-US"/>
           </a:p>
@@ -2912,7 +2913,7 @@
           <a:p>
             <a:fld id="{58A749B2-B91D-4C1A-83E6-7AD02F774933}" type="datetimeFigureOut">
               <a:rPr lang="zh-CN" altLang="en-US" smtClean="0"/>
-              <a:t>2024/5/26</a:t>
+              <a:t>2024/5/27</a:t>
             </a:fld>
             <a:endParaRPr lang="zh-CN" altLang="en-US"/>
           </a:p>
@@ -4214,6 +4215,116 @@
 </p:sld>
 </file>
 
+<file path=ppt/slides/slide5.xml><?xml version="1.0" encoding="utf-8"?>
+<p:sld xmlns:a="http://schemas.openxmlformats.org/drawingml/2006/main" xmlns:r="http://schemas.openxmlformats.org/officeDocument/2006/relationships" xmlns:p="http://schemas.openxmlformats.org/presentationml/2006/main">
+  <p:cSld>
+    <p:spTree>
+      <p:nvGrpSpPr>
+        <p:cNvPr id="1" name=""/>
+        <p:cNvGrpSpPr/>
+        <p:nvPr/>
+      </p:nvGrpSpPr>
+      <p:grpSpPr>
+        <a:xfrm>
+          <a:off x="0" y="0"/>
+          <a:ext cx="0" cy="0"/>
+          <a:chOff x="0" y="0"/>
+          <a:chExt cx="0" cy="0"/>
+        </a:xfrm>
+      </p:grpSpPr>
+      <p:pic>
+        <p:nvPicPr>
+          <p:cNvPr id="2" name="图片 1">
+            <a:extLst>
+              <a:ext uri="{FF2B5EF4-FFF2-40B4-BE49-F238E27FC236}">
+                <a16:creationId xmlns:a16="http://schemas.microsoft.com/office/drawing/2014/main" id="{A2E9BBDF-C706-044D-E678-C35587CF22F1}"/>
+              </a:ext>
+            </a:extLst>
+          </p:cNvPr>
+          <p:cNvPicPr>
+            <a:picLocks noChangeAspect="1"/>
+          </p:cNvPicPr>
+          <p:nvPr/>
+        </p:nvPicPr>
+        <p:blipFill>
+          <a:blip r:embed="rId2"/>
+          <a:stretch>
+            <a:fillRect/>
+          </a:stretch>
+        </p:blipFill>
+        <p:spPr>
+          <a:xfrm>
+            <a:off x="2780277" y="1107336"/>
+            <a:ext cx="4429157" cy="3509988"/>
+          </a:xfrm>
+          <a:prstGeom prst="rect">
+            <a:avLst/>
+          </a:prstGeom>
+        </p:spPr>
+      </p:pic>
+      <p:sp>
+        <p:nvSpPr>
+          <p:cNvPr id="3" name="矩形 2">
+            <a:extLst>
+              <a:ext uri="{FF2B5EF4-FFF2-40B4-BE49-F238E27FC236}">
+                <a16:creationId xmlns:a16="http://schemas.microsoft.com/office/drawing/2014/main" id="{8A358A46-24FE-281E-0EB8-02D4F2732C09}"/>
+              </a:ext>
+            </a:extLst>
+          </p:cNvPr>
+          <p:cNvSpPr/>
+          <p:nvPr/>
+        </p:nvSpPr>
+        <p:spPr>
+          <a:xfrm>
+            <a:off x="5090424" y="3771267"/>
+            <a:ext cx="2262158" cy="923330"/>
+          </a:xfrm>
+          <a:prstGeom prst="rect">
+            <a:avLst/>
+          </a:prstGeom>
+          <a:noFill/>
+        </p:spPr>
+        <p:txBody>
+          <a:bodyPr wrap="none" lIns="91440" tIns="45720" rIns="91440" bIns="45720">
+            <a:spAutoFit/>
+          </a:bodyPr>
+          <a:lstStyle/>
+          <a:p>
+            <a:pPr algn="ctr"/>
+            <a:r>
+              <a:rPr lang="zh-CN" altLang="en-US" sz="5400" b="0" cap="none" spc="0" dirty="0">
+                <a:ln w="0"/>
+                <a:solidFill>
+                  <a:schemeClr val="bg1"/>
+                </a:solidFill>
+                <a:effectLst>
+                  <a:outerShdw blurRad="38100" dist="19050" dir="2700000" algn="tl" rotWithShape="0">
+                    <a:schemeClr val="dk1">
+                      <a:alpha val="40000"/>
+                    </a:schemeClr>
+                  </a:outerShdw>
+                </a:effectLst>
+                <a:latin typeface="华文行楷" panose="02010800040101010101" pitchFamily="2" charset="-122"/>
+                <a:ea typeface="华文行楷" panose="02010800040101010101" pitchFamily="2" charset="-122"/>
+              </a:rPr>
+              <a:t>月月记</a:t>
+            </a:r>
+          </a:p>
+        </p:txBody>
+      </p:sp>
+    </p:spTree>
+    <p:extLst>
+      <p:ext uri="{BB962C8B-B14F-4D97-AF65-F5344CB8AC3E}">
+        <p14:creationId xmlns:p14="http://schemas.microsoft.com/office/powerpoint/2010/main" val="4018706834"/>
+      </p:ext>
+    </p:extLst>
+  </p:cSld>
+  <p:clrMapOvr>
+    <a:masterClrMapping/>
+  </p:clrMapOvr>
+</p:sld>
+</file>
+
 <file path=ppt/theme/theme1.xml><?xml version="1.0" encoding="utf-8"?>
 <a:theme xmlns:a="http://schemas.openxmlformats.org/drawingml/2006/main" name="Office 主题​​">
   <a:themeElements>

</xml_diff>

<commit_message>
Site updated: 2024-09-06 20:42:51
</commit_message>
<xml_diff>
--- a/img/pic.pptx
+++ b/img/pic.pptx
@@ -6,10 +6,12 @@
   </p:sldMasterIdLst>
   <p:sldIdLst>
     <p:sldId id="256" r:id="rId2"/>
-    <p:sldId id="257" r:id="rId3"/>
-    <p:sldId id="258" r:id="rId4"/>
-    <p:sldId id="259" r:id="rId5"/>
-    <p:sldId id="260" r:id="rId6"/>
+    <p:sldId id="261" r:id="rId3"/>
+    <p:sldId id="257" r:id="rId4"/>
+    <p:sldId id="258" r:id="rId5"/>
+    <p:sldId id="259" r:id="rId6"/>
+    <p:sldId id="260" r:id="rId7"/>
+    <p:sldId id="262" r:id="rId8"/>
   </p:sldIdLst>
   <p:sldSz cx="12192000" cy="6858000"/>
   <p:notesSz cx="6858000" cy="9144000"/>
@@ -263,7 +265,7 @@
           <a:p>
             <a:fld id="{58A749B2-B91D-4C1A-83E6-7AD02F774933}" type="datetimeFigureOut">
               <a:rPr lang="zh-CN" altLang="en-US" smtClean="0"/>
-              <a:t>2024/5/27</a:t>
+              <a:t>2024/9/6</a:t>
             </a:fld>
             <a:endParaRPr lang="zh-CN" altLang="en-US"/>
           </a:p>
@@ -461,7 +463,7 @@
           <a:p>
             <a:fld id="{58A749B2-B91D-4C1A-83E6-7AD02F774933}" type="datetimeFigureOut">
               <a:rPr lang="zh-CN" altLang="en-US" smtClean="0"/>
-              <a:t>2024/5/27</a:t>
+              <a:t>2024/9/6</a:t>
             </a:fld>
             <a:endParaRPr lang="zh-CN" altLang="en-US"/>
           </a:p>
@@ -669,7 +671,7 @@
           <a:p>
             <a:fld id="{58A749B2-B91D-4C1A-83E6-7AD02F774933}" type="datetimeFigureOut">
               <a:rPr lang="zh-CN" altLang="en-US" smtClean="0"/>
-              <a:t>2024/5/27</a:t>
+              <a:t>2024/9/6</a:t>
             </a:fld>
             <a:endParaRPr lang="zh-CN" altLang="en-US"/>
           </a:p>
@@ -867,7 +869,7 @@
           <a:p>
             <a:fld id="{58A749B2-B91D-4C1A-83E6-7AD02F774933}" type="datetimeFigureOut">
               <a:rPr lang="zh-CN" altLang="en-US" smtClean="0"/>
-              <a:t>2024/5/27</a:t>
+              <a:t>2024/9/6</a:t>
             </a:fld>
             <a:endParaRPr lang="zh-CN" altLang="en-US"/>
           </a:p>
@@ -1142,7 +1144,7 @@
           <a:p>
             <a:fld id="{58A749B2-B91D-4C1A-83E6-7AD02F774933}" type="datetimeFigureOut">
               <a:rPr lang="zh-CN" altLang="en-US" smtClean="0"/>
-              <a:t>2024/5/27</a:t>
+              <a:t>2024/9/6</a:t>
             </a:fld>
             <a:endParaRPr lang="zh-CN" altLang="en-US"/>
           </a:p>
@@ -1407,7 +1409,7 @@
           <a:p>
             <a:fld id="{58A749B2-B91D-4C1A-83E6-7AD02F774933}" type="datetimeFigureOut">
               <a:rPr lang="zh-CN" altLang="en-US" smtClean="0"/>
-              <a:t>2024/5/27</a:t>
+              <a:t>2024/9/6</a:t>
             </a:fld>
             <a:endParaRPr lang="zh-CN" altLang="en-US"/>
           </a:p>
@@ -1819,7 +1821,7 @@
           <a:p>
             <a:fld id="{58A749B2-B91D-4C1A-83E6-7AD02F774933}" type="datetimeFigureOut">
               <a:rPr lang="zh-CN" altLang="en-US" smtClean="0"/>
-              <a:t>2024/5/27</a:t>
+              <a:t>2024/9/6</a:t>
             </a:fld>
             <a:endParaRPr lang="zh-CN" altLang="en-US"/>
           </a:p>
@@ -1960,7 +1962,7 @@
           <a:p>
             <a:fld id="{58A749B2-B91D-4C1A-83E6-7AD02F774933}" type="datetimeFigureOut">
               <a:rPr lang="zh-CN" altLang="en-US" smtClean="0"/>
-              <a:t>2024/5/27</a:t>
+              <a:t>2024/9/6</a:t>
             </a:fld>
             <a:endParaRPr lang="zh-CN" altLang="en-US"/>
           </a:p>
@@ -2073,7 +2075,7 @@
           <a:p>
             <a:fld id="{58A749B2-B91D-4C1A-83E6-7AD02F774933}" type="datetimeFigureOut">
               <a:rPr lang="zh-CN" altLang="en-US" smtClean="0"/>
-              <a:t>2024/5/27</a:t>
+              <a:t>2024/9/6</a:t>
             </a:fld>
             <a:endParaRPr lang="zh-CN" altLang="en-US"/>
           </a:p>
@@ -2384,7 +2386,7 @@
           <a:p>
             <a:fld id="{58A749B2-B91D-4C1A-83E6-7AD02F774933}" type="datetimeFigureOut">
               <a:rPr lang="zh-CN" altLang="en-US" smtClean="0"/>
-              <a:t>2024/5/27</a:t>
+              <a:t>2024/9/6</a:t>
             </a:fld>
             <a:endParaRPr lang="zh-CN" altLang="en-US"/>
           </a:p>
@@ -2672,7 +2674,7 @@
           <a:p>
             <a:fld id="{58A749B2-B91D-4C1A-83E6-7AD02F774933}" type="datetimeFigureOut">
               <a:rPr lang="zh-CN" altLang="en-US" smtClean="0"/>
-              <a:t>2024/5/27</a:t>
+              <a:t>2024/9/6</a:t>
             </a:fld>
             <a:endParaRPr lang="zh-CN" altLang="en-US"/>
           </a:p>
@@ -2913,7 +2915,7 @@
           <a:p>
             <a:fld id="{58A749B2-B91D-4C1A-83E6-7AD02F774933}" type="datetimeFigureOut">
               <a:rPr lang="zh-CN" altLang="en-US" smtClean="0"/>
-              <a:t>2024/5/27</a:t>
+              <a:t>2024/9/6</a:t>
             </a:fld>
             <a:endParaRPr lang="zh-CN" altLang="en-US"/>
           </a:p>
@@ -3457,10 +3459,10 @@
       </p:grpSpPr>
       <p:pic>
         <p:nvPicPr>
-          <p:cNvPr id="2" name="图片 1">
-            <a:extLst>
-              <a:ext uri="{FF2B5EF4-FFF2-40B4-BE49-F238E27FC236}">
-                <a16:creationId xmlns:a16="http://schemas.microsoft.com/office/drawing/2014/main" id="{18307BB2-8510-23D6-2FF7-2913C9E5358A}"/>
+          <p:cNvPr id="7" name="图片 6">
+            <a:extLst>
+              <a:ext uri="{FF2B5EF4-FFF2-40B4-BE49-F238E27FC236}">
+                <a16:creationId xmlns:a16="http://schemas.microsoft.com/office/drawing/2014/main" id="{520DBDDE-D7E8-649F-FF74-C5F836B2177A}"/>
               </a:ext>
             </a:extLst>
           </p:cNvPr>
@@ -3470,115 +3472,37 @@
           <p:nvPr/>
         </p:nvPicPr>
         <p:blipFill>
-          <a:blip r:embed="rId2">
-            <a:extLst>
-              <a:ext uri="{28A0092B-C50C-407E-A947-70E740481C1C}">
-                <a14:useLocalDpi xmlns:a14="http://schemas.microsoft.com/office/drawing/2010/main" val="0"/>
-              </a:ext>
-            </a:extLst>
-          </a:blip>
+          <a:blip r:embed="rId2"/>
           <a:stretch>
             <a:fillRect/>
           </a:stretch>
         </p:blipFill>
         <p:spPr>
           <a:xfrm>
-            <a:off x="1846291" y="859157"/>
-            <a:ext cx="5581385" cy="3139529"/>
-          </a:xfrm>
-          <a:prstGeom prst="rect">
-            <a:avLst/>
-          </a:prstGeom>
-          <a:effectLst>
-            <a:reflection endPos="0" dist="50800" dir="5400000" sy="-100000" algn="bl" rotWithShape="0"/>
-          </a:effectLst>
-        </p:spPr>
-      </p:pic>
-      <p:pic>
-        <p:nvPicPr>
-          <p:cNvPr id="3" name="图片 2">
-            <a:extLst>
-              <a:ext uri="{FF2B5EF4-FFF2-40B4-BE49-F238E27FC236}">
-                <a16:creationId xmlns:a16="http://schemas.microsoft.com/office/drawing/2014/main" id="{5F39A048-5F64-38B5-51DA-55E7151EC42B}"/>
-              </a:ext>
-            </a:extLst>
-          </p:cNvPr>
-          <p:cNvPicPr>
-            <a:picLocks noChangeAspect="1"/>
-          </p:cNvPicPr>
-          <p:nvPr/>
-        </p:nvPicPr>
-        <p:blipFill>
-          <a:blip r:embed="rId3"/>
-          <a:stretch>
-            <a:fillRect/>
-          </a:stretch>
-        </p:blipFill>
-        <p:spPr>
-          <a:xfrm>
-            <a:off x="8263045" y="1829135"/>
-            <a:ext cx="1471623" cy="1414473"/>
+            <a:off x="2505076" y="2754783"/>
+            <a:ext cx="6513660" cy="3467263"/>
           </a:xfrm>
           <a:prstGeom prst="rect">
             <a:avLst/>
           </a:prstGeom>
         </p:spPr>
       </p:pic>
-      <p:pic>
-        <p:nvPicPr>
-          <p:cNvPr id="4" name="图片 3">
-            <a:extLst>
-              <a:ext uri="{FF2B5EF4-FFF2-40B4-BE49-F238E27FC236}">
-                <a16:creationId xmlns:a16="http://schemas.microsoft.com/office/drawing/2014/main" id="{3E0C5581-ED1C-5AE7-071F-E94B7AB69402}"/>
-              </a:ext>
-            </a:extLst>
-          </p:cNvPr>
-          <p:cNvPicPr>
-            <a:picLocks noChangeAspect="1"/>
-          </p:cNvPicPr>
+      <p:sp>
+        <p:nvSpPr>
+          <p:cNvPr id="6" name="矩形 5">
+            <a:extLst>
+              <a:ext uri="{FF2B5EF4-FFF2-40B4-BE49-F238E27FC236}">
+                <a16:creationId xmlns:a16="http://schemas.microsoft.com/office/drawing/2014/main" id="{F8776CA8-79BB-FE08-20A9-904F0BDB5D5C}"/>
+              </a:ext>
+            </a:extLst>
+          </p:cNvPr>
+          <p:cNvSpPr/>
           <p:nvPr/>
-        </p:nvPicPr>
-        <p:blipFill>
-          <a:blip r:embed="rId2">
-            <a:extLst>
-              <a:ext uri="{28A0092B-C50C-407E-A947-70E740481C1C}">
-                <a14:useLocalDpi xmlns:a14="http://schemas.microsoft.com/office/drawing/2010/main" val="0"/>
-              </a:ext>
-            </a:extLst>
-          </a:blip>
-          <a:stretch>
-            <a:fillRect/>
-          </a:stretch>
-        </p:blipFill>
+        </p:nvSpPr>
         <p:spPr>
           <a:xfrm>
-            <a:off x="176330" y="3206996"/>
-            <a:ext cx="7106672" cy="3743181"/>
-          </a:xfrm>
-          <a:prstGeom prst="rect">
-            <a:avLst/>
-          </a:prstGeom>
-          <a:effectLst>
-            <a:reflection endPos="0" dist="50800" dir="5400000" sy="-100000" algn="bl" rotWithShape="0"/>
-          </a:effectLst>
-        </p:spPr>
-      </p:pic>
-      <p:sp>
-        <p:nvSpPr>
-          <p:cNvPr id="6" name="矩形 5">
-            <a:extLst>
-              <a:ext uri="{FF2B5EF4-FFF2-40B4-BE49-F238E27FC236}">
-                <a16:creationId xmlns:a16="http://schemas.microsoft.com/office/drawing/2014/main" id="{4E58FB89-5202-0383-E3B9-99B492940378}"/>
-              </a:ext>
-            </a:extLst>
-          </p:cNvPr>
-          <p:cNvSpPr/>
-          <p:nvPr/>
-        </p:nvSpPr>
-        <p:spPr>
-          <a:xfrm>
-            <a:off x="1998691" y="1173195"/>
-            <a:ext cx="2313454" cy="2646878"/>
+            <a:off x="2933391" y="3765140"/>
+            <a:ext cx="5657030" cy="1446550"/>
           </a:xfrm>
           <a:prstGeom prst="rect">
             <a:avLst/>
@@ -3586,14 +3510,14 @@
           <a:noFill/>
         </p:spPr>
         <p:txBody>
-          <a:bodyPr wrap="none" lIns="91440" tIns="45720" rIns="91440" bIns="45720">
+          <a:bodyPr wrap="square" lIns="91440" tIns="45720" rIns="91440" bIns="45720">
             <a:spAutoFit/>
           </a:bodyPr>
           <a:lstStyle/>
           <a:p>
             <a:pPr algn="ctr"/>
             <a:r>
-              <a:rPr lang="zh-CN" altLang="en-US" sz="16600" dirty="0">
+              <a:rPr lang="en-US" altLang="zh-CN" sz="4400" dirty="0">
                 <a:ln w="0"/>
                 <a:solidFill>
                   <a:schemeClr val="bg1"/>
@@ -3605,12 +3529,65 @@
                     </a:schemeClr>
                   </a:outerShdw>
                 </a:effectLst>
-                <a:latin typeface="华文行楷" panose="02010800040101010101" pitchFamily="2" charset="-122"/>
-                <a:ea typeface="华文行楷" panose="02010800040101010101" pitchFamily="2" charset="-122"/>
+                <a:latin typeface="华文新魏" panose="02010800040101010101" pitchFamily="2" charset="-122"/>
+                <a:ea typeface="华文新魏" panose="02010800040101010101" pitchFamily="2" charset="-122"/>
               </a:rPr>
-              <a:t>汐</a:t>
-            </a:r>
-            <a:endParaRPr lang="zh-CN" altLang="en-US" sz="16600" b="0" cap="none" spc="0" dirty="0">
+              <a:t>IMU</a:t>
+            </a:r>
+            <a:r>
+              <a:rPr lang="zh-CN" altLang="en-US" sz="4400" dirty="0">
+                <a:ln w="0"/>
+                <a:solidFill>
+                  <a:schemeClr val="bg1"/>
+                </a:solidFill>
+                <a:effectLst>
+                  <a:outerShdw blurRad="38100" dist="19050" dir="2700000" algn="tl" rotWithShape="0">
+                    <a:schemeClr val="dk1">
+                      <a:alpha val="40000"/>
+                    </a:schemeClr>
+                  </a:outerShdw>
+                </a:effectLst>
+                <a:latin typeface="华文新魏" panose="02010800040101010101" pitchFamily="2" charset="-122"/>
+                <a:ea typeface="华文新魏" panose="02010800040101010101" pitchFamily="2" charset="-122"/>
+              </a:rPr>
+              <a:t>预积分</a:t>
+            </a:r>
+            <a:br>
+              <a:rPr lang="en-US" altLang="zh-CN" sz="4400" dirty="0">
+                <a:ln w="0"/>
+                <a:solidFill>
+                  <a:schemeClr val="bg1"/>
+                </a:solidFill>
+                <a:effectLst>
+                  <a:outerShdw blurRad="38100" dist="19050" dir="2700000" algn="tl" rotWithShape="0">
+                    <a:schemeClr val="dk1">
+                      <a:alpha val="40000"/>
+                    </a:schemeClr>
+                  </a:outerShdw>
+                </a:effectLst>
+                <a:latin typeface="华文新魏" panose="02010800040101010101" pitchFamily="2" charset="-122"/>
+                <a:ea typeface="华文新魏" panose="02010800040101010101" pitchFamily="2" charset="-122"/>
+              </a:rPr>
+            </a:br>
+            <a:r>
+              <a:rPr lang="zh-CN" altLang="en-US" sz="4400" dirty="0">
+                <a:ln w="0"/>
+                <a:solidFill>
+                  <a:schemeClr val="bg1"/>
+                </a:solidFill>
+                <a:effectLst>
+                  <a:outerShdw blurRad="38100" dist="19050" dir="2700000" algn="tl" rotWithShape="0">
+                    <a:schemeClr val="dk1">
+                      <a:alpha val="40000"/>
+                    </a:schemeClr>
+                  </a:outerShdw>
+                </a:effectLst>
+                <a:latin typeface="华文新魏" panose="02010800040101010101" pitchFamily="2" charset="-122"/>
+                <a:ea typeface="华文新魏" panose="02010800040101010101" pitchFamily="2" charset="-122"/>
+              </a:rPr>
+              <a:t>基本思路过程</a:t>
+            </a:r>
+            <a:endParaRPr lang="zh-CN" altLang="en-US" sz="4400" b="0" cap="none" spc="0" dirty="0">
               <a:ln w="0"/>
               <a:solidFill>
                 <a:schemeClr val="bg1"/>
@@ -3622,73 +3599,8 @@
                   </a:schemeClr>
                 </a:outerShdw>
               </a:effectLst>
-              <a:latin typeface="华文行楷" panose="02010800040101010101" pitchFamily="2" charset="-122"/>
-              <a:ea typeface="华文行楷" panose="02010800040101010101" pitchFamily="2" charset="-122"/>
-            </a:endParaRPr>
-          </a:p>
-        </p:txBody>
-      </p:sp>
-      <p:sp>
-        <p:nvSpPr>
-          <p:cNvPr id="7" name="矩形 6">
-            <a:extLst>
-              <a:ext uri="{FF2B5EF4-FFF2-40B4-BE49-F238E27FC236}">
-                <a16:creationId xmlns:a16="http://schemas.microsoft.com/office/drawing/2014/main" id="{9DFC419B-8D50-3186-7E8A-B82DF77C24C2}"/>
-              </a:ext>
-            </a:extLst>
-          </p:cNvPr>
-          <p:cNvSpPr/>
-          <p:nvPr/>
-        </p:nvSpPr>
-        <p:spPr>
-          <a:xfrm>
-            <a:off x="31656" y="3755147"/>
-            <a:ext cx="7109639" cy="1015663"/>
-          </a:xfrm>
-          <a:prstGeom prst="rect">
-            <a:avLst/>
-          </a:prstGeom>
-          <a:noFill/>
-        </p:spPr>
-        <p:txBody>
-          <a:bodyPr wrap="none" lIns="91440" tIns="45720" rIns="91440" bIns="45720">
-            <a:spAutoFit/>
-          </a:bodyPr>
-          <a:lstStyle/>
-          <a:p>
-            <a:pPr algn="ctr"/>
-            <a:r>
-              <a:rPr lang="zh-CN" altLang="en-US" sz="6000" dirty="0">
-                <a:ln w="0"/>
-                <a:solidFill>
-                  <a:schemeClr val="bg1"/>
-                </a:solidFill>
-                <a:effectLst>
-                  <a:outerShdw blurRad="38100" dist="19050" dir="2700000" algn="tl" rotWithShape="0">
-                    <a:schemeClr val="dk1">
-                      <a:alpha val="40000"/>
-                    </a:schemeClr>
-                  </a:outerShdw>
-                </a:effectLst>
-                <a:latin typeface="华文行楷" panose="02010800040101010101" pitchFamily="2" charset="-122"/>
-                <a:ea typeface="华文行楷" panose="02010800040101010101" pitchFamily="2" charset="-122"/>
-              </a:rPr>
-              <a:t>因子图优化相关问题</a:t>
-            </a:r>
-            <a:endParaRPr lang="zh-CN" altLang="en-US" sz="6000" b="0" cap="none" spc="0" dirty="0">
-              <a:ln w="0"/>
-              <a:solidFill>
-                <a:schemeClr val="bg1"/>
-              </a:solidFill>
-              <a:effectLst>
-                <a:outerShdw blurRad="38100" dist="19050" dir="2700000" algn="tl" rotWithShape="0">
-                  <a:schemeClr val="dk1">
-                    <a:alpha val="40000"/>
-                  </a:schemeClr>
-                </a:outerShdw>
-              </a:effectLst>
-              <a:latin typeface="华文行楷" panose="02010800040101010101" pitchFamily="2" charset="-122"/>
-              <a:ea typeface="华文行楷" panose="02010800040101010101" pitchFamily="2" charset="-122"/>
+              <a:latin typeface="华文新魏" panose="02010800040101010101" pitchFamily="2" charset="-122"/>
+              <a:ea typeface="华文新魏" panose="02010800040101010101" pitchFamily="2" charset="-122"/>
             </a:endParaRPr>
           </a:p>
         </p:txBody>
@@ -3696,7 +3608,7 @@
     </p:spTree>
     <p:extLst>
       <p:ext uri="{BB962C8B-B14F-4D97-AF65-F5344CB8AC3E}">
-        <p14:creationId xmlns:p14="http://schemas.microsoft.com/office/powerpoint/2010/main" val="1162833254"/>
+        <p14:creationId xmlns:p14="http://schemas.microsoft.com/office/powerpoint/2010/main" val="2456616712"/>
       </p:ext>
     </p:extLst>
   </p:cSld>
@@ -3751,7 +3663,7 @@
         </p:blipFill>
         <p:spPr>
           <a:xfrm>
-            <a:off x="1649691" y="966606"/>
+            <a:off x="1846291" y="859157"/>
             <a:ext cx="5581385" cy="3139529"/>
           </a:xfrm>
           <a:prstGeom prst="rect">
@@ -3820,7 +3732,7 @@
         </p:blipFill>
         <p:spPr>
           <a:xfrm>
-            <a:off x="1074418" y="4372206"/>
+            <a:off x="176330" y="3206996"/>
             <a:ext cx="7106672" cy="3743181"/>
           </a:xfrm>
           <a:prstGeom prst="rect">
@@ -3845,8 +3757,8 @@
         </p:nvSpPr>
         <p:spPr>
           <a:xfrm>
-            <a:off x="7320557" y="2132671"/>
-            <a:ext cx="5032148" cy="1569660"/>
+            <a:off x="1998691" y="1173195"/>
+            <a:ext cx="2313454" cy="2646878"/>
           </a:xfrm>
           <a:prstGeom prst="rect">
             <a:avLst/>
@@ -3861,7 +3773,7 @@
           <a:p>
             <a:pPr algn="ctr"/>
             <a:r>
-              <a:rPr lang="en-US" altLang="zh-CN" sz="9600" dirty="0">
+              <a:rPr lang="zh-CN" altLang="en-US" sz="16600" dirty="0">
                 <a:ln w="0"/>
                 <a:solidFill>
                   <a:schemeClr val="bg1"/>
@@ -3876,27 +3788,9 @@
                 <a:latin typeface="华文行楷" panose="02010800040101010101" pitchFamily="2" charset="-122"/>
                 <a:ea typeface="华文行楷" panose="02010800040101010101" pitchFamily="2" charset="-122"/>
               </a:rPr>
-              <a:t>C++</a:t>
-            </a:r>
-            <a:r>
-              <a:rPr lang="zh-CN" altLang="en-US" sz="9600" dirty="0">
-                <a:ln w="0"/>
-                <a:solidFill>
-                  <a:schemeClr val="bg1"/>
-                </a:solidFill>
-                <a:effectLst>
-                  <a:outerShdw blurRad="38100" dist="19050" dir="2700000" algn="tl" rotWithShape="0">
-                    <a:schemeClr val="dk1">
-                      <a:alpha val="40000"/>
-                    </a:schemeClr>
-                  </a:outerShdw>
-                </a:effectLst>
-                <a:latin typeface="华文行楷" panose="02010800040101010101" pitchFamily="2" charset="-122"/>
-                <a:ea typeface="华文行楷" panose="02010800040101010101" pitchFamily="2" charset="-122"/>
-              </a:rPr>
-              <a:t>学习</a:t>
-            </a:r>
-            <a:endParaRPr lang="zh-CN" altLang="en-US" sz="9600" b="0" cap="none" spc="0" dirty="0">
+              <a:t>汐</a:t>
+            </a:r>
+            <a:endParaRPr lang="zh-CN" altLang="en-US" sz="16600" b="0" cap="none" spc="0" dirty="0">
               <a:ln w="0"/>
               <a:solidFill>
                 <a:schemeClr val="bg1"/>
@@ -3928,7 +3822,7 @@
         </p:nvSpPr>
         <p:spPr>
           <a:xfrm>
-            <a:off x="971814" y="4727097"/>
+            <a:off x="31656" y="3755147"/>
             <a:ext cx="7109639" cy="1015663"/>
           </a:xfrm>
           <a:prstGeom prst="rect">
@@ -3979,123 +3873,10 @@
           </a:p>
         </p:txBody>
       </p:sp>
-      <p:pic>
-        <p:nvPicPr>
-          <p:cNvPr id="5" name="图片 4">
-            <a:extLst>
-              <a:ext uri="{FF2B5EF4-FFF2-40B4-BE49-F238E27FC236}">
-                <a16:creationId xmlns:a16="http://schemas.microsoft.com/office/drawing/2014/main" id="{6176AF20-7AED-6942-370D-59501BBD8954}"/>
-              </a:ext>
-            </a:extLst>
-          </p:cNvPr>
-          <p:cNvPicPr>
-            <a:picLocks noChangeAspect="1"/>
-          </p:cNvPicPr>
-          <p:nvPr/>
-        </p:nvPicPr>
-        <p:blipFill>
-          <a:blip r:embed="rId4"/>
-          <a:stretch>
-            <a:fillRect/>
-          </a:stretch>
-        </p:blipFill>
-        <p:spPr>
-          <a:xfrm>
-            <a:off x="1451725" y="1078270"/>
-            <a:ext cx="5295939" cy="3976717"/>
-          </a:xfrm>
-          <a:prstGeom prst="rect">
-            <a:avLst/>
-          </a:prstGeom>
-        </p:spPr>
-      </p:pic>
-      <p:sp>
-        <p:nvSpPr>
-          <p:cNvPr id="8" name="矩形 7">
-            <a:extLst>
-              <a:ext uri="{FF2B5EF4-FFF2-40B4-BE49-F238E27FC236}">
-                <a16:creationId xmlns:a16="http://schemas.microsoft.com/office/drawing/2014/main" id="{C1A0DEB2-34EA-3B5E-A988-CA7490DBF046}"/>
-              </a:ext>
-            </a:extLst>
-          </p:cNvPr>
-          <p:cNvSpPr/>
-          <p:nvPr/>
-        </p:nvSpPr>
-        <p:spPr>
-          <a:xfrm>
-            <a:off x="1935136" y="1999579"/>
-            <a:ext cx="5032148" cy="1569660"/>
-          </a:xfrm>
-          <a:prstGeom prst="rect">
-            <a:avLst/>
-          </a:prstGeom>
-          <a:noFill/>
-        </p:spPr>
-        <p:txBody>
-          <a:bodyPr wrap="none" lIns="91440" tIns="45720" rIns="91440" bIns="45720">
-            <a:spAutoFit/>
-          </a:bodyPr>
-          <a:lstStyle/>
-          <a:p>
-            <a:pPr algn="ctr"/>
-            <a:r>
-              <a:rPr lang="en-US" altLang="zh-CN" sz="9600" dirty="0">
-                <a:ln w="0"/>
-                <a:solidFill>
-                  <a:schemeClr val="bg1"/>
-                </a:solidFill>
-                <a:effectLst>
-                  <a:outerShdw blurRad="38100" dist="19050" dir="2700000" algn="tl" rotWithShape="0">
-                    <a:schemeClr val="dk1">
-                      <a:alpha val="40000"/>
-                    </a:schemeClr>
-                  </a:outerShdw>
-                </a:effectLst>
-                <a:latin typeface="华文行楷" panose="02010800040101010101" pitchFamily="2" charset="-122"/>
-                <a:ea typeface="华文行楷" panose="02010800040101010101" pitchFamily="2" charset="-122"/>
-              </a:rPr>
-              <a:t>C++</a:t>
-            </a:r>
-            <a:r>
-              <a:rPr lang="zh-CN" altLang="en-US" sz="9600" dirty="0">
-                <a:ln w="0"/>
-                <a:solidFill>
-                  <a:schemeClr val="bg1"/>
-                </a:solidFill>
-                <a:effectLst>
-                  <a:outerShdw blurRad="38100" dist="19050" dir="2700000" algn="tl" rotWithShape="0">
-                    <a:schemeClr val="dk1">
-                      <a:alpha val="40000"/>
-                    </a:schemeClr>
-                  </a:outerShdw>
-                </a:effectLst>
-                <a:latin typeface="华文行楷" panose="02010800040101010101" pitchFamily="2" charset="-122"/>
-                <a:ea typeface="华文行楷" panose="02010800040101010101" pitchFamily="2" charset="-122"/>
-              </a:rPr>
-              <a:t>学习</a:t>
-            </a:r>
-            <a:endParaRPr lang="zh-CN" altLang="en-US" sz="9600" b="0" cap="none" spc="0" dirty="0">
-              <a:ln w="0"/>
-              <a:solidFill>
-                <a:schemeClr val="bg1"/>
-              </a:solidFill>
-              <a:effectLst>
-                <a:outerShdw blurRad="38100" dist="19050" dir="2700000" algn="tl" rotWithShape="0">
-                  <a:schemeClr val="dk1">
-                    <a:alpha val="40000"/>
-                  </a:schemeClr>
-                </a:outerShdw>
-              </a:effectLst>
-              <a:latin typeface="华文行楷" panose="02010800040101010101" pitchFamily="2" charset="-122"/>
-              <a:ea typeface="华文行楷" panose="02010800040101010101" pitchFamily="2" charset="-122"/>
-            </a:endParaRPr>
-          </a:p>
-        </p:txBody>
-      </p:sp>
     </p:spTree>
     <p:extLst>
       <p:ext uri="{BB962C8B-B14F-4D97-AF65-F5344CB8AC3E}">
-        <p14:creationId xmlns:p14="http://schemas.microsoft.com/office/powerpoint/2010/main" val="3818139286"/>
+        <p14:creationId xmlns:p14="http://schemas.microsoft.com/office/powerpoint/2010/main" val="1162833254"/>
       </p:ext>
     </p:extLst>
   </p:cSld>
@@ -4124,10 +3905,10 @@
       </p:grpSpPr>
       <p:pic>
         <p:nvPicPr>
-          <p:cNvPr id="4" name="图片 3">
-            <a:extLst>
-              <a:ext uri="{FF2B5EF4-FFF2-40B4-BE49-F238E27FC236}">
-                <a16:creationId xmlns:a16="http://schemas.microsoft.com/office/drawing/2014/main" id="{1A782AC0-43C4-AC14-E7D9-02DC59E93AE1}"/>
+          <p:cNvPr id="2" name="图片 1">
+            <a:extLst>
+              <a:ext uri="{FF2B5EF4-FFF2-40B4-BE49-F238E27FC236}">
+                <a16:creationId xmlns:a16="http://schemas.microsoft.com/office/drawing/2014/main" id="{18307BB2-8510-23D6-2FF7-2913C9E5358A}"/>
               </a:ext>
             </a:extLst>
           </p:cNvPr>
@@ -4137,27 +3918,105 @@
           <p:nvPr/>
         </p:nvPicPr>
         <p:blipFill>
-          <a:blip r:embed="rId2"/>
+          <a:blip r:embed="rId2">
+            <a:extLst>
+              <a:ext uri="{28A0092B-C50C-407E-A947-70E740481C1C}">
+                <a14:useLocalDpi xmlns:a14="http://schemas.microsoft.com/office/drawing/2010/main" val="0"/>
+              </a:ext>
+            </a:extLst>
+          </a:blip>
           <a:stretch>
             <a:fillRect/>
           </a:stretch>
         </p:blipFill>
         <p:spPr>
           <a:xfrm>
-            <a:off x="2509213" y="1199565"/>
-            <a:ext cx="6634786" cy="4878180"/>
+            <a:off x="1649691" y="966606"/>
+            <a:ext cx="5581385" cy="3139529"/>
+          </a:xfrm>
+          <a:prstGeom prst="rect">
+            <a:avLst/>
+          </a:prstGeom>
+          <a:effectLst>
+            <a:reflection endPos="0" dist="50800" dir="5400000" sy="-100000" algn="bl" rotWithShape="0"/>
+          </a:effectLst>
+        </p:spPr>
+      </p:pic>
+      <p:pic>
+        <p:nvPicPr>
+          <p:cNvPr id="3" name="图片 2">
+            <a:extLst>
+              <a:ext uri="{FF2B5EF4-FFF2-40B4-BE49-F238E27FC236}">
+                <a16:creationId xmlns:a16="http://schemas.microsoft.com/office/drawing/2014/main" id="{5F39A048-5F64-38B5-51DA-55E7151EC42B}"/>
+              </a:ext>
+            </a:extLst>
+          </p:cNvPr>
+          <p:cNvPicPr>
+            <a:picLocks noChangeAspect="1"/>
+          </p:cNvPicPr>
+          <p:nvPr/>
+        </p:nvPicPr>
+        <p:blipFill>
+          <a:blip r:embed="rId3"/>
+          <a:stretch>
+            <a:fillRect/>
+          </a:stretch>
+        </p:blipFill>
+        <p:spPr>
+          <a:xfrm>
+            <a:off x="8263045" y="1829135"/>
+            <a:ext cx="1471623" cy="1414473"/>
           </a:xfrm>
           <a:prstGeom prst="rect">
             <a:avLst/>
           </a:prstGeom>
         </p:spPr>
       </p:pic>
-      <p:sp>
-        <p:nvSpPr>
-          <p:cNvPr id="5" name="矩形 4">
-            <a:extLst>
-              <a:ext uri="{FF2B5EF4-FFF2-40B4-BE49-F238E27FC236}">
-                <a16:creationId xmlns:a16="http://schemas.microsoft.com/office/drawing/2014/main" id="{5133D3C1-5EC9-B360-36E9-0F29F16A3DD9}"/>
+      <p:pic>
+        <p:nvPicPr>
+          <p:cNvPr id="4" name="图片 3">
+            <a:extLst>
+              <a:ext uri="{FF2B5EF4-FFF2-40B4-BE49-F238E27FC236}">
+                <a16:creationId xmlns:a16="http://schemas.microsoft.com/office/drawing/2014/main" id="{3E0C5581-ED1C-5AE7-071F-E94B7AB69402}"/>
+              </a:ext>
+            </a:extLst>
+          </p:cNvPr>
+          <p:cNvPicPr>
+            <a:picLocks noChangeAspect="1"/>
+          </p:cNvPicPr>
+          <p:nvPr/>
+        </p:nvPicPr>
+        <p:blipFill>
+          <a:blip r:embed="rId2">
+            <a:extLst>
+              <a:ext uri="{28A0092B-C50C-407E-A947-70E740481C1C}">
+                <a14:useLocalDpi xmlns:a14="http://schemas.microsoft.com/office/drawing/2010/main" val="0"/>
+              </a:ext>
+            </a:extLst>
+          </a:blip>
+          <a:stretch>
+            <a:fillRect/>
+          </a:stretch>
+        </p:blipFill>
+        <p:spPr>
+          <a:xfrm>
+            <a:off x="1074418" y="4372206"/>
+            <a:ext cx="7106672" cy="3743181"/>
+          </a:xfrm>
+          <a:prstGeom prst="rect">
+            <a:avLst/>
+          </a:prstGeom>
+          <a:effectLst>
+            <a:reflection endPos="0" dist="50800" dir="5400000" sy="-100000" algn="bl" rotWithShape="0"/>
+          </a:effectLst>
+        </p:spPr>
+      </p:pic>
+      <p:sp>
+        <p:nvSpPr>
+          <p:cNvPr id="6" name="矩形 5">
+            <a:extLst>
+              <a:ext uri="{FF2B5EF4-FFF2-40B4-BE49-F238E27FC236}">
+                <a16:creationId xmlns:a16="http://schemas.microsoft.com/office/drawing/2014/main" id="{4E58FB89-5202-0383-E3B9-99B492940378}"/>
               </a:ext>
             </a:extLst>
           </p:cNvPr>
@@ -4166,8 +4025,8 @@
         </p:nvSpPr>
         <p:spPr>
           <a:xfrm>
-            <a:off x="5158105" y="4042721"/>
-            <a:ext cx="2262158" cy="923330"/>
+            <a:off x="7320557" y="2132671"/>
+            <a:ext cx="5032148" cy="1569660"/>
           </a:xfrm>
           <a:prstGeom prst="rect">
             <a:avLst/>
@@ -4182,10 +4041,10 @@
           <a:p>
             <a:pPr algn="ctr"/>
             <a:r>
-              <a:rPr lang="zh-CN" altLang="en-US" sz="5400" b="0" cap="none" spc="0" dirty="0">
+              <a:rPr lang="en-US" altLang="zh-CN" sz="9600" dirty="0">
                 <a:ln w="0"/>
                 <a:solidFill>
-                  <a:schemeClr val="tx1"/>
+                  <a:schemeClr val="bg1"/>
                 </a:solidFill>
                 <a:effectLst>
                   <a:outerShdw blurRad="38100" dist="19050" dir="2700000" algn="tl" rotWithShape="0">
@@ -4197,15 +4056,226 @@
                 <a:latin typeface="华文行楷" panose="02010800040101010101" pitchFamily="2" charset="-122"/>
                 <a:ea typeface="华文行楷" panose="02010800040101010101" pitchFamily="2" charset="-122"/>
               </a:rPr>
-              <a:t>碎碎念</a:t>
-            </a:r>
+              <a:t>C++</a:t>
+            </a:r>
+            <a:r>
+              <a:rPr lang="zh-CN" altLang="en-US" sz="9600" dirty="0">
+                <a:ln w="0"/>
+                <a:solidFill>
+                  <a:schemeClr val="bg1"/>
+                </a:solidFill>
+                <a:effectLst>
+                  <a:outerShdw blurRad="38100" dist="19050" dir="2700000" algn="tl" rotWithShape="0">
+                    <a:schemeClr val="dk1">
+                      <a:alpha val="40000"/>
+                    </a:schemeClr>
+                  </a:outerShdw>
+                </a:effectLst>
+                <a:latin typeface="华文行楷" panose="02010800040101010101" pitchFamily="2" charset="-122"/>
+                <a:ea typeface="华文行楷" panose="02010800040101010101" pitchFamily="2" charset="-122"/>
+              </a:rPr>
+              <a:t>学习</a:t>
+            </a:r>
+            <a:endParaRPr lang="zh-CN" altLang="en-US" sz="9600" b="0" cap="none" spc="0" dirty="0">
+              <a:ln w="0"/>
+              <a:solidFill>
+                <a:schemeClr val="bg1"/>
+              </a:solidFill>
+              <a:effectLst>
+                <a:outerShdw blurRad="38100" dist="19050" dir="2700000" algn="tl" rotWithShape="0">
+                  <a:schemeClr val="dk1">
+                    <a:alpha val="40000"/>
+                  </a:schemeClr>
+                </a:outerShdw>
+              </a:effectLst>
+              <a:latin typeface="华文行楷" panose="02010800040101010101" pitchFamily="2" charset="-122"/>
+              <a:ea typeface="华文行楷" panose="02010800040101010101" pitchFamily="2" charset="-122"/>
+            </a:endParaRPr>
+          </a:p>
+        </p:txBody>
+      </p:sp>
+      <p:sp>
+        <p:nvSpPr>
+          <p:cNvPr id="7" name="矩形 6">
+            <a:extLst>
+              <a:ext uri="{FF2B5EF4-FFF2-40B4-BE49-F238E27FC236}">
+                <a16:creationId xmlns:a16="http://schemas.microsoft.com/office/drawing/2014/main" id="{9DFC419B-8D50-3186-7E8A-B82DF77C24C2}"/>
+              </a:ext>
+            </a:extLst>
+          </p:cNvPr>
+          <p:cNvSpPr/>
+          <p:nvPr/>
+        </p:nvSpPr>
+        <p:spPr>
+          <a:xfrm>
+            <a:off x="971814" y="4727097"/>
+            <a:ext cx="7109639" cy="1015663"/>
+          </a:xfrm>
+          <a:prstGeom prst="rect">
+            <a:avLst/>
+          </a:prstGeom>
+          <a:noFill/>
+        </p:spPr>
+        <p:txBody>
+          <a:bodyPr wrap="none" lIns="91440" tIns="45720" rIns="91440" bIns="45720">
+            <a:spAutoFit/>
+          </a:bodyPr>
+          <a:lstStyle/>
+          <a:p>
+            <a:pPr algn="ctr"/>
+            <a:r>
+              <a:rPr lang="zh-CN" altLang="en-US" sz="6000" dirty="0">
+                <a:ln w="0"/>
+                <a:solidFill>
+                  <a:schemeClr val="bg1"/>
+                </a:solidFill>
+                <a:effectLst>
+                  <a:outerShdw blurRad="38100" dist="19050" dir="2700000" algn="tl" rotWithShape="0">
+                    <a:schemeClr val="dk1">
+                      <a:alpha val="40000"/>
+                    </a:schemeClr>
+                  </a:outerShdw>
+                </a:effectLst>
+                <a:latin typeface="华文行楷" panose="02010800040101010101" pitchFamily="2" charset="-122"/>
+                <a:ea typeface="华文行楷" panose="02010800040101010101" pitchFamily="2" charset="-122"/>
+              </a:rPr>
+              <a:t>因子图优化相关问题</a:t>
+            </a:r>
+            <a:endParaRPr lang="zh-CN" altLang="en-US" sz="6000" b="0" cap="none" spc="0" dirty="0">
+              <a:ln w="0"/>
+              <a:solidFill>
+                <a:schemeClr val="bg1"/>
+              </a:solidFill>
+              <a:effectLst>
+                <a:outerShdw blurRad="38100" dist="19050" dir="2700000" algn="tl" rotWithShape="0">
+                  <a:schemeClr val="dk1">
+                    <a:alpha val="40000"/>
+                  </a:schemeClr>
+                </a:outerShdw>
+              </a:effectLst>
+              <a:latin typeface="华文行楷" panose="02010800040101010101" pitchFamily="2" charset="-122"/>
+              <a:ea typeface="华文行楷" panose="02010800040101010101" pitchFamily="2" charset="-122"/>
+            </a:endParaRPr>
+          </a:p>
+        </p:txBody>
+      </p:sp>
+      <p:pic>
+        <p:nvPicPr>
+          <p:cNvPr id="5" name="图片 4">
+            <a:extLst>
+              <a:ext uri="{FF2B5EF4-FFF2-40B4-BE49-F238E27FC236}">
+                <a16:creationId xmlns:a16="http://schemas.microsoft.com/office/drawing/2014/main" id="{6176AF20-7AED-6942-370D-59501BBD8954}"/>
+              </a:ext>
+            </a:extLst>
+          </p:cNvPr>
+          <p:cNvPicPr>
+            <a:picLocks noChangeAspect="1"/>
+          </p:cNvPicPr>
+          <p:nvPr/>
+        </p:nvPicPr>
+        <p:blipFill>
+          <a:blip r:embed="rId4"/>
+          <a:stretch>
+            <a:fillRect/>
+          </a:stretch>
+        </p:blipFill>
+        <p:spPr>
+          <a:xfrm>
+            <a:off x="1451725" y="1078270"/>
+            <a:ext cx="5295939" cy="3976717"/>
+          </a:xfrm>
+          <a:prstGeom prst="rect">
+            <a:avLst/>
+          </a:prstGeom>
+        </p:spPr>
+      </p:pic>
+      <p:sp>
+        <p:nvSpPr>
+          <p:cNvPr id="8" name="矩形 7">
+            <a:extLst>
+              <a:ext uri="{FF2B5EF4-FFF2-40B4-BE49-F238E27FC236}">
+                <a16:creationId xmlns:a16="http://schemas.microsoft.com/office/drawing/2014/main" id="{C1A0DEB2-34EA-3B5E-A988-CA7490DBF046}"/>
+              </a:ext>
+            </a:extLst>
+          </p:cNvPr>
+          <p:cNvSpPr/>
+          <p:nvPr/>
+        </p:nvSpPr>
+        <p:spPr>
+          <a:xfrm>
+            <a:off x="1935136" y="1999579"/>
+            <a:ext cx="5032148" cy="1569660"/>
+          </a:xfrm>
+          <a:prstGeom prst="rect">
+            <a:avLst/>
+          </a:prstGeom>
+          <a:noFill/>
+        </p:spPr>
+        <p:txBody>
+          <a:bodyPr wrap="none" lIns="91440" tIns="45720" rIns="91440" bIns="45720">
+            <a:spAutoFit/>
+          </a:bodyPr>
+          <a:lstStyle/>
+          <a:p>
+            <a:pPr algn="ctr"/>
+            <a:r>
+              <a:rPr lang="en-US" altLang="zh-CN" sz="9600" dirty="0">
+                <a:ln w="0"/>
+                <a:solidFill>
+                  <a:schemeClr val="bg1"/>
+                </a:solidFill>
+                <a:effectLst>
+                  <a:outerShdw blurRad="38100" dist="19050" dir="2700000" algn="tl" rotWithShape="0">
+                    <a:schemeClr val="dk1">
+                      <a:alpha val="40000"/>
+                    </a:schemeClr>
+                  </a:outerShdw>
+                </a:effectLst>
+                <a:latin typeface="华文行楷" panose="02010800040101010101" pitchFamily="2" charset="-122"/>
+                <a:ea typeface="华文行楷" panose="02010800040101010101" pitchFamily="2" charset="-122"/>
+              </a:rPr>
+              <a:t>C++</a:t>
+            </a:r>
+            <a:r>
+              <a:rPr lang="zh-CN" altLang="en-US" sz="9600" dirty="0">
+                <a:ln w="0"/>
+                <a:solidFill>
+                  <a:schemeClr val="bg1"/>
+                </a:solidFill>
+                <a:effectLst>
+                  <a:outerShdw blurRad="38100" dist="19050" dir="2700000" algn="tl" rotWithShape="0">
+                    <a:schemeClr val="dk1">
+                      <a:alpha val="40000"/>
+                    </a:schemeClr>
+                  </a:outerShdw>
+                </a:effectLst>
+                <a:latin typeface="华文行楷" panose="02010800040101010101" pitchFamily="2" charset="-122"/>
+                <a:ea typeface="华文行楷" panose="02010800040101010101" pitchFamily="2" charset="-122"/>
+              </a:rPr>
+              <a:t>学习</a:t>
+            </a:r>
+            <a:endParaRPr lang="zh-CN" altLang="en-US" sz="9600" b="0" cap="none" spc="0" dirty="0">
+              <a:ln w="0"/>
+              <a:solidFill>
+                <a:schemeClr val="bg1"/>
+              </a:solidFill>
+              <a:effectLst>
+                <a:outerShdw blurRad="38100" dist="19050" dir="2700000" algn="tl" rotWithShape="0">
+                  <a:schemeClr val="dk1">
+                    <a:alpha val="40000"/>
+                  </a:schemeClr>
+                </a:outerShdw>
+              </a:effectLst>
+              <a:latin typeface="华文行楷" panose="02010800040101010101" pitchFamily="2" charset="-122"/>
+              <a:ea typeface="华文行楷" panose="02010800040101010101" pitchFamily="2" charset="-122"/>
+            </a:endParaRPr>
           </a:p>
         </p:txBody>
       </p:sp>
     </p:spTree>
     <p:extLst>
       <p:ext uri="{BB962C8B-B14F-4D97-AF65-F5344CB8AC3E}">
-        <p14:creationId xmlns:p14="http://schemas.microsoft.com/office/powerpoint/2010/main" val="3264562608"/>
+        <p14:creationId xmlns:p14="http://schemas.microsoft.com/office/powerpoint/2010/main" val="3818139286"/>
       </p:ext>
     </p:extLst>
   </p:cSld>
@@ -4234,6 +4304,116 @@
       </p:grpSpPr>
       <p:pic>
         <p:nvPicPr>
+          <p:cNvPr id="4" name="图片 3">
+            <a:extLst>
+              <a:ext uri="{FF2B5EF4-FFF2-40B4-BE49-F238E27FC236}">
+                <a16:creationId xmlns:a16="http://schemas.microsoft.com/office/drawing/2014/main" id="{1A782AC0-43C4-AC14-E7D9-02DC59E93AE1}"/>
+              </a:ext>
+            </a:extLst>
+          </p:cNvPr>
+          <p:cNvPicPr>
+            <a:picLocks noChangeAspect="1"/>
+          </p:cNvPicPr>
+          <p:nvPr/>
+        </p:nvPicPr>
+        <p:blipFill>
+          <a:blip r:embed="rId2"/>
+          <a:stretch>
+            <a:fillRect/>
+          </a:stretch>
+        </p:blipFill>
+        <p:spPr>
+          <a:xfrm>
+            <a:off x="2509213" y="1199565"/>
+            <a:ext cx="6634786" cy="4878180"/>
+          </a:xfrm>
+          <a:prstGeom prst="rect">
+            <a:avLst/>
+          </a:prstGeom>
+        </p:spPr>
+      </p:pic>
+      <p:sp>
+        <p:nvSpPr>
+          <p:cNvPr id="5" name="矩形 4">
+            <a:extLst>
+              <a:ext uri="{FF2B5EF4-FFF2-40B4-BE49-F238E27FC236}">
+                <a16:creationId xmlns:a16="http://schemas.microsoft.com/office/drawing/2014/main" id="{5133D3C1-5EC9-B360-36E9-0F29F16A3DD9}"/>
+              </a:ext>
+            </a:extLst>
+          </p:cNvPr>
+          <p:cNvSpPr/>
+          <p:nvPr/>
+        </p:nvSpPr>
+        <p:spPr>
+          <a:xfrm>
+            <a:off x="5158105" y="4042721"/>
+            <a:ext cx="2262158" cy="923330"/>
+          </a:xfrm>
+          <a:prstGeom prst="rect">
+            <a:avLst/>
+          </a:prstGeom>
+          <a:noFill/>
+        </p:spPr>
+        <p:txBody>
+          <a:bodyPr wrap="none" lIns="91440" tIns="45720" rIns="91440" bIns="45720">
+            <a:spAutoFit/>
+          </a:bodyPr>
+          <a:lstStyle/>
+          <a:p>
+            <a:pPr algn="ctr"/>
+            <a:r>
+              <a:rPr lang="zh-CN" altLang="en-US" sz="5400" b="0" cap="none" spc="0" dirty="0">
+                <a:ln w="0"/>
+                <a:solidFill>
+                  <a:schemeClr val="tx1"/>
+                </a:solidFill>
+                <a:effectLst>
+                  <a:outerShdw blurRad="38100" dist="19050" dir="2700000" algn="tl" rotWithShape="0">
+                    <a:schemeClr val="dk1">
+                      <a:alpha val="40000"/>
+                    </a:schemeClr>
+                  </a:outerShdw>
+                </a:effectLst>
+                <a:latin typeface="华文行楷" panose="02010800040101010101" pitchFamily="2" charset="-122"/>
+                <a:ea typeface="华文行楷" panose="02010800040101010101" pitchFamily="2" charset="-122"/>
+              </a:rPr>
+              <a:t>碎碎念</a:t>
+            </a:r>
+          </a:p>
+        </p:txBody>
+      </p:sp>
+    </p:spTree>
+    <p:extLst>
+      <p:ext uri="{BB962C8B-B14F-4D97-AF65-F5344CB8AC3E}">
+        <p14:creationId xmlns:p14="http://schemas.microsoft.com/office/powerpoint/2010/main" val="3264562608"/>
+      </p:ext>
+    </p:extLst>
+  </p:cSld>
+  <p:clrMapOvr>
+    <a:masterClrMapping/>
+  </p:clrMapOvr>
+</p:sld>
+</file>
+
+<file path=ppt/slides/slide6.xml><?xml version="1.0" encoding="utf-8"?>
+<p:sld xmlns:a="http://schemas.openxmlformats.org/drawingml/2006/main" xmlns:r="http://schemas.openxmlformats.org/officeDocument/2006/relationships" xmlns:p="http://schemas.openxmlformats.org/presentationml/2006/main">
+  <p:cSld>
+    <p:spTree>
+      <p:nvGrpSpPr>
+        <p:cNvPr id="1" name=""/>
+        <p:cNvGrpSpPr/>
+        <p:nvPr/>
+      </p:nvGrpSpPr>
+      <p:grpSpPr>
+        <a:xfrm>
+          <a:off x="0" y="0"/>
+          <a:ext cx="0" cy="0"/>
+          <a:chOff x="0" y="0"/>
+          <a:chExt cx="0" cy="0"/>
+        </a:xfrm>
+      </p:grpSpPr>
+      <p:pic>
+        <p:nvPicPr>
           <p:cNvPr id="2" name="图片 1">
             <a:extLst>
               <a:ext uri="{FF2B5EF4-FFF2-40B4-BE49-F238E27FC236}">
@@ -4316,6 +4496,140 @@
     <p:extLst>
       <p:ext uri="{BB962C8B-B14F-4D97-AF65-F5344CB8AC3E}">
         <p14:creationId xmlns:p14="http://schemas.microsoft.com/office/powerpoint/2010/main" val="4018706834"/>
+      </p:ext>
+    </p:extLst>
+  </p:cSld>
+  <p:clrMapOvr>
+    <a:masterClrMapping/>
+  </p:clrMapOvr>
+</p:sld>
+</file>
+
+<file path=ppt/slides/slide7.xml><?xml version="1.0" encoding="utf-8"?>
+<p:sld xmlns:a="http://schemas.openxmlformats.org/drawingml/2006/main" xmlns:r="http://schemas.openxmlformats.org/officeDocument/2006/relationships" xmlns:p="http://schemas.openxmlformats.org/presentationml/2006/main">
+  <p:cSld>
+    <p:spTree>
+      <p:nvGrpSpPr>
+        <p:cNvPr id="1" name=""/>
+        <p:cNvGrpSpPr/>
+        <p:nvPr/>
+      </p:nvGrpSpPr>
+      <p:grpSpPr>
+        <a:xfrm>
+          <a:off x="0" y="0"/>
+          <a:ext cx="0" cy="0"/>
+          <a:chOff x="0" y="0"/>
+          <a:chExt cx="0" cy="0"/>
+        </a:xfrm>
+      </p:grpSpPr>
+      <p:pic>
+        <p:nvPicPr>
+          <p:cNvPr id="4" name="图片 3">
+            <a:extLst>
+              <a:ext uri="{FF2B5EF4-FFF2-40B4-BE49-F238E27FC236}">
+                <a16:creationId xmlns:a16="http://schemas.microsoft.com/office/drawing/2014/main" id="{E25430F4-1843-8278-ABD0-5DDC7458F2D6}"/>
+              </a:ext>
+            </a:extLst>
+          </p:cNvPr>
+          <p:cNvPicPr>
+            <a:picLocks noChangeAspect="1"/>
+          </p:cNvPicPr>
+          <p:nvPr/>
+        </p:nvPicPr>
+        <p:blipFill>
+          <a:blip r:embed="rId2">
+            <a:extLst>
+              <a:ext uri="{28A0092B-C50C-407E-A947-70E740481C1C}">
+                <a14:useLocalDpi xmlns:a14="http://schemas.microsoft.com/office/drawing/2010/main" val="0"/>
+              </a:ext>
+            </a:extLst>
+          </a:blip>
+          <a:stretch>
+            <a:fillRect/>
+          </a:stretch>
+        </p:blipFill>
+        <p:spPr>
+          <a:xfrm>
+            <a:off x="1846291" y="859157"/>
+            <a:ext cx="8758486" cy="4926648"/>
+          </a:xfrm>
+          <a:prstGeom prst="rect">
+            <a:avLst/>
+          </a:prstGeom>
+          <a:effectLst>
+            <a:reflection endPos="0" dist="50800" dir="5400000" sy="-100000" algn="bl" rotWithShape="0"/>
+          </a:effectLst>
+        </p:spPr>
+      </p:pic>
+      <p:sp>
+        <p:nvSpPr>
+          <p:cNvPr id="5" name="矩形 4">
+            <a:extLst>
+              <a:ext uri="{FF2B5EF4-FFF2-40B4-BE49-F238E27FC236}">
+                <a16:creationId xmlns:a16="http://schemas.microsoft.com/office/drawing/2014/main" id="{89A861C3-4EA1-7F1F-D297-758CE894B34E}"/>
+              </a:ext>
+            </a:extLst>
+          </p:cNvPr>
+          <p:cNvSpPr/>
+          <p:nvPr/>
+        </p:nvSpPr>
+        <p:spPr>
+          <a:xfrm>
+            <a:off x="2152619" y="1400365"/>
+            <a:ext cx="7285969" cy="1015663"/>
+          </a:xfrm>
+          <a:prstGeom prst="rect">
+            <a:avLst/>
+          </a:prstGeom>
+          <a:noFill/>
+        </p:spPr>
+        <p:txBody>
+          <a:bodyPr wrap="none" lIns="91440" tIns="45720" rIns="91440" bIns="45720">
+            <a:spAutoFit/>
+          </a:bodyPr>
+          <a:lstStyle/>
+          <a:p>
+            <a:pPr algn="ctr"/>
+            <a:r>
+              <a:rPr lang="zh-CN" altLang="en-US" sz="6000" dirty="0">
+                <a:ln w="0"/>
+                <a:solidFill>
+                  <a:schemeClr val="bg1"/>
+                </a:solidFill>
+                <a:effectLst>
+                  <a:outerShdw blurRad="38100" dist="19050" dir="2700000" algn="tl" rotWithShape="0">
+                    <a:schemeClr val="dk1">
+                      <a:alpha val="40000"/>
+                    </a:schemeClr>
+                  </a:outerShdw>
+                </a:effectLst>
+                <a:latin typeface="华文行楷" panose="02010800040101010101" pitchFamily="2" charset="-122"/>
+                <a:ea typeface="华文行楷" panose="02010800040101010101" pitchFamily="2" charset="-122"/>
+              </a:rPr>
+              <a:t>因子图优化相关代码</a:t>
+            </a:r>
+            <a:endParaRPr lang="zh-CN" altLang="en-US" sz="6000" b="0" cap="none" spc="0" dirty="0">
+              <a:ln w="0"/>
+              <a:solidFill>
+                <a:schemeClr val="bg1"/>
+              </a:solidFill>
+              <a:effectLst>
+                <a:outerShdw blurRad="38100" dist="19050" dir="2700000" algn="tl" rotWithShape="0">
+                  <a:schemeClr val="dk1">
+                    <a:alpha val="40000"/>
+                  </a:schemeClr>
+                </a:outerShdw>
+              </a:effectLst>
+              <a:latin typeface="华文行楷" panose="02010800040101010101" pitchFamily="2" charset="-122"/>
+              <a:ea typeface="华文行楷" panose="02010800040101010101" pitchFamily="2" charset="-122"/>
+            </a:endParaRPr>
+          </a:p>
+        </p:txBody>
+      </p:sp>
+    </p:spTree>
+    <p:extLst>
+      <p:ext uri="{BB962C8B-B14F-4D97-AF65-F5344CB8AC3E}">
+        <p14:creationId xmlns:p14="http://schemas.microsoft.com/office/powerpoint/2010/main" val="3478036451"/>
       </p:ext>
     </p:extLst>
   </p:cSld>

</xml_diff>

<commit_message>
Site updated: 2024-10-22 11:43:35
</commit_message>
<xml_diff>
--- a/img/pic.pptx
+++ b/img/pic.pptx
@@ -7,11 +7,12 @@
   <p:sldIdLst>
     <p:sldId id="256" r:id="rId2"/>
     <p:sldId id="261" r:id="rId3"/>
-    <p:sldId id="257" r:id="rId4"/>
-    <p:sldId id="258" r:id="rId5"/>
-    <p:sldId id="259" r:id="rId6"/>
-    <p:sldId id="260" r:id="rId7"/>
-    <p:sldId id="262" r:id="rId8"/>
+    <p:sldId id="263" r:id="rId4"/>
+    <p:sldId id="257" r:id="rId5"/>
+    <p:sldId id="258" r:id="rId6"/>
+    <p:sldId id="259" r:id="rId7"/>
+    <p:sldId id="260" r:id="rId8"/>
+    <p:sldId id="262" r:id="rId9"/>
   </p:sldIdLst>
   <p:sldSz cx="12192000" cy="6858000"/>
   <p:notesSz cx="6858000" cy="9144000"/>
@@ -265,7 +266,7 @@
           <a:p>
             <a:fld id="{58A749B2-B91D-4C1A-83E6-7AD02F774933}" type="datetimeFigureOut">
               <a:rPr lang="zh-CN" altLang="en-US" smtClean="0"/>
-              <a:t>2024/9/6</a:t>
+              <a:t>2024/9/15</a:t>
             </a:fld>
             <a:endParaRPr lang="zh-CN" altLang="en-US"/>
           </a:p>
@@ -463,7 +464,7 @@
           <a:p>
             <a:fld id="{58A749B2-B91D-4C1A-83E6-7AD02F774933}" type="datetimeFigureOut">
               <a:rPr lang="zh-CN" altLang="en-US" smtClean="0"/>
-              <a:t>2024/9/6</a:t>
+              <a:t>2024/9/15</a:t>
             </a:fld>
             <a:endParaRPr lang="zh-CN" altLang="en-US"/>
           </a:p>
@@ -671,7 +672,7 @@
           <a:p>
             <a:fld id="{58A749B2-B91D-4C1A-83E6-7AD02F774933}" type="datetimeFigureOut">
               <a:rPr lang="zh-CN" altLang="en-US" smtClean="0"/>
-              <a:t>2024/9/6</a:t>
+              <a:t>2024/9/15</a:t>
             </a:fld>
             <a:endParaRPr lang="zh-CN" altLang="en-US"/>
           </a:p>
@@ -869,7 +870,7 @@
           <a:p>
             <a:fld id="{58A749B2-B91D-4C1A-83E6-7AD02F774933}" type="datetimeFigureOut">
               <a:rPr lang="zh-CN" altLang="en-US" smtClean="0"/>
-              <a:t>2024/9/6</a:t>
+              <a:t>2024/9/15</a:t>
             </a:fld>
             <a:endParaRPr lang="zh-CN" altLang="en-US"/>
           </a:p>
@@ -1144,7 +1145,7 @@
           <a:p>
             <a:fld id="{58A749B2-B91D-4C1A-83E6-7AD02F774933}" type="datetimeFigureOut">
               <a:rPr lang="zh-CN" altLang="en-US" smtClean="0"/>
-              <a:t>2024/9/6</a:t>
+              <a:t>2024/9/15</a:t>
             </a:fld>
             <a:endParaRPr lang="zh-CN" altLang="en-US"/>
           </a:p>
@@ -1409,7 +1410,7 @@
           <a:p>
             <a:fld id="{58A749B2-B91D-4C1A-83E6-7AD02F774933}" type="datetimeFigureOut">
               <a:rPr lang="zh-CN" altLang="en-US" smtClean="0"/>
-              <a:t>2024/9/6</a:t>
+              <a:t>2024/9/15</a:t>
             </a:fld>
             <a:endParaRPr lang="zh-CN" altLang="en-US"/>
           </a:p>
@@ -1821,7 +1822,7 @@
           <a:p>
             <a:fld id="{58A749B2-B91D-4C1A-83E6-7AD02F774933}" type="datetimeFigureOut">
               <a:rPr lang="zh-CN" altLang="en-US" smtClean="0"/>
-              <a:t>2024/9/6</a:t>
+              <a:t>2024/9/15</a:t>
             </a:fld>
             <a:endParaRPr lang="zh-CN" altLang="en-US"/>
           </a:p>
@@ -1962,7 +1963,7 @@
           <a:p>
             <a:fld id="{58A749B2-B91D-4C1A-83E6-7AD02F774933}" type="datetimeFigureOut">
               <a:rPr lang="zh-CN" altLang="en-US" smtClean="0"/>
-              <a:t>2024/9/6</a:t>
+              <a:t>2024/9/15</a:t>
             </a:fld>
             <a:endParaRPr lang="zh-CN" altLang="en-US"/>
           </a:p>
@@ -2075,7 +2076,7 @@
           <a:p>
             <a:fld id="{58A749B2-B91D-4C1A-83E6-7AD02F774933}" type="datetimeFigureOut">
               <a:rPr lang="zh-CN" altLang="en-US" smtClean="0"/>
-              <a:t>2024/9/6</a:t>
+              <a:t>2024/9/15</a:t>
             </a:fld>
             <a:endParaRPr lang="zh-CN" altLang="en-US"/>
           </a:p>
@@ -2386,7 +2387,7 @@
           <a:p>
             <a:fld id="{58A749B2-B91D-4C1A-83E6-7AD02F774933}" type="datetimeFigureOut">
               <a:rPr lang="zh-CN" altLang="en-US" smtClean="0"/>
-              <a:t>2024/9/6</a:t>
+              <a:t>2024/9/15</a:t>
             </a:fld>
             <a:endParaRPr lang="zh-CN" altLang="en-US"/>
           </a:p>
@@ -2674,7 +2675,7 @@
           <a:p>
             <a:fld id="{58A749B2-B91D-4C1A-83E6-7AD02F774933}" type="datetimeFigureOut">
               <a:rPr lang="zh-CN" altLang="en-US" smtClean="0"/>
-              <a:t>2024/9/6</a:t>
+              <a:t>2024/9/15</a:t>
             </a:fld>
             <a:endParaRPr lang="zh-CN" altLang="en-US"/>
           </a:p>
@@ -2915,7 +2916,7 @@
           <a:p>
             <a:fld id="{58A749B2-B91D-4C1A-83E6-7AD02F774933}" type="datetimeFigureOut">
               <a:rPr lang="zh-CN" altLang="en-US" smtClean="0"/>
-              <a:t>2024/9/6</a:t>
+              <a:t>2024/9/15</a:t>
             </a:fld>
             <a:endParaRPr lang="zh-CN" altLang="en-US"/>
           </a:p>
@@ -3637,10 +3638,10 @@
       </p:grpSpPr>
       <p:pic>
         <p:nvPicPr>
-          <p:cNvPr id="2" name="图片 1">
-            <a:extLst>
-              <a:ext uri="{FF2B5EF4-FFF2-40B4-BE49-F238E27FC236}">
-                <a16:creationId xmlns:a16="http://schemas.microsoft.com/office/drawing/2014/main" id="{18307BB2-8510-23D6-2FF7-2913C9E5358A}"/>
+          <p:cNvPr id="7" name="图片 6">
+            <a:extLst>
+              <a:ext uri="{FF2B5EF4-FFF2-40B4-BE49-F238E27FC236}">
+                <a16:creationId xmlns:a16="http://schemas.microsoft.com/office/drawing/2014/main" id="{520DBDDE-D7E8-649F-FF74-C5F836B2177A}"/>
               </a:ext>
             </a:extLst>
           </p:cNvPr>
@@ -3650,115 +3651,37 @@
           <p:nvPr/>
         </p:nvPicPr>
         <p:blipFill>
-          <a:blip r:embed="rId2">
-            <a:extLst>
-              <a:ext uri="{28A0092B-C50C-407E-A947-70E740481C1C}">
-                <a14:useLocalDpi xmlns:a14="http://schemas.microsoft.com/office/drawing/2010/main" val="0"/>
-              </a:ext>
-            </a:extLst>
-          </a:blip>
+          <a:blip r:embed="rId2"/>
           <a:stretch>
             <a:fillRect/>
           </a:stretch>
         </p:blipFill>
         <p:spPr>
           <a:xfrm>
-            <a:off x="1846291" y="859157"/>
-            <a:ext cx="5581385" cy="3139529"/>
-          </a:xfrm>
-          <a:prstGeom prst="rect">
-            <a:avLst/>
-          </a:prstGeom>
-          <a:effectLst>
-            <a:reflection endPos="0" dist="50800" dir="5400000" sy="-100000" algn="bl" rotWithShape="0"/>
-          </a:effectLst>
-        </p:spPr>
-      </p:pic>
-      <p:pic>
-        <p:nvPicPr>
-          <p:cNvPr id="3" name="图片 2">
-            <a:extLst>
-              <a:ext uri="{FF2B5EF4-FFF2-40B4-BE49-F238E27FC236}">
-                <a16:creationId xmlns:a16="http://schemas.microsoft.com/office/drawing/2014/main" id="{5F39A048-5F64-38B5-51DA-55E7151EC42B}"/>
-              </a:ext>
-            </a:extLst>
-          </p:cNvPr>
-          <p:cNvPicPr>
-            <a:picLocks noChangeAspect="1"/>
-          </p:cNvPicPr>
-          <p:nvPr/>
-        </p:nvPicPr>
-        <p:blipFill>
-          <a:blip r:embed="rId3"/>
-          <a:stretch>
-            <a:fillRect/>
-          </a:stretch>
-        </p:blipFill>
-        <p:spPr>
-          <a:xfrm>
-            <a:off x="8263045" y="1829135"/>
-            <a:ext cx="1471623" cy="1414473"/>
+            <a:off x="1606859" y="796510"/>
+            <a:ext cx="10604325" cy="5644750"/>
           </a:xfrm>
           <a:prstGeom prst="rect">
             <a:avLst/>
           </a:prstGeom>
         </p:spPr>
       </p:pic>
-      <p:pic>
-        <p:nvPicPr>
-          <p:cNvPr id="4" name="图片 3">
-            <a:extLst>
-              <a:ext uri="{FF2B5EF4-FFF2-40B4-BE49-F238E27FC236}">
-                <a16:creationId xmlns:a16="http://schemas.microsoft.com/office/drawing/2014/main" id="{3E0C5581-ED1C-5AE7-071F-E94B7AB69402}"/>
-              </a:ext>
-            </a:extLst>
-          </p:cNvPr>
-          <p:cNvPicPr>
-            <a:picLocks noChangeAspect="1"/>
-          </p:cNvPicPr>
+      <p:sp>
+        <p:nvSpPr>
+          <p:cNvPr id="6" name="矩形 5">
+            <a:extLst>
+              <a:ext uri="{FF2B5EF4-FFF2-40B4-BE49-F238E27FC236}">
+                <a16:creationId xmlns:a16="http://schemas.microsoft.com/office/drawing/2014/main" id="{F8776CA8-79BB-FE08-20A9-904F0BDB5D5C}"/>
+              </a:ext>
+            </a:extLst>
+          </p:cNvPr>
+          <p:cNvSpPr/>
           <p:nvPr/>
-        </p:nvPicPr>
-        <p:blipFill>
-          <a:blip r:embed="rId2">
-            <a:extLst>
-              <a:ext uri="{28A0092B-C50C-407E-A947-70E740481C1C}">
-                <a14:useLocalDpi xmlns:a14="http://schemas.microsoft.com/office/drawing/2010/main" val="0"/>
-              </a:ext>
-            </a:extLst>
-          </a:blip>
-          <a:stretch>
-            <a:fillRect/>
-          </a:stretch>
-        </p:blipFill>
+        </p:nvSpPr>
         <p:spPr>
           <a:xfrm>
-            <a:off x="176330" y="3206996"/>
-            <a:ext cx="7106672" cy="3743181"/>
-          </a:xfrm>
-          <a:prstGeom prst="rect">
-            <a:avLst/>
-          </a:prstGeom>
-          <a:effectLst>
-            <a:reflection endPos="0" dist="50800" dir="5400000" sy="-100000" algn="bl" rotWithShape="0"/>
-          </a:effectLst>
-        </p:spPr>
-      </p:pic>
-      <p:sp>
-        <p:nvSpPr>
-          <p:cNvPr id="6" name="矩形 5">
-            <a:extLst>
-              <a:ext uri="{FF2B5EF4-FFF2-40B4-BE49-F238E27FC236}">
-                <a16:creationId xmlns:a16="http://schemas.microsoft.com/office/drawing/2014/main" id="{4E58FB89-5202-0383-E3B9-99B492940378}"/>
-              </a:ext>
-            </a:extLst>
-          </p:cNvPr>
-          <p:cNvSpPr/>
-          <p:nvPr/>
-        </p:nvSpPr>
-        <p:spPr>
-          <a:xfrm>
-            <a:off x="1998691" y="1173195"/>
-            <a:ext cx="2313454" cy="2646878"/>
+            <a:off x="3459373" y="1717856"/>
+            <a:ext cx="8193157" cy="1446550"/>
           </a:xfrm>
           <a:prstGeom prst="rect">
             <a:avLst/>
@@ -3766,14 +3689,14 @@
           <a:noFill/>
         </p:spPr>
         <p:txBody>
-          <a:bodyPr wrap="none" lIns="91440" tIns="45720" rIns="91440" bIns="45720">
+          <a:bodyPr wrap="square" lIns="91440" tIns="45720" rIns="91440" bIns="45720">
             <a:spAutoFit/>
           </a:bodyPr>
           <a:lstStyle/>
           <a:p>
             <a:pPr algn="ctr"/>
             <a:r>
-              <a:rPr lang="zh-CN" altLang="en-US" sz="16600" dirty="0">
+              <a:rPr lang="zh-CN" altLang="en-US" sz="8800" b="0" cap="none" spc="0" dirty="0">
                 <a:ln w="0"/>
                 <a:solidFill>
                   <a:schemeClr val="bg1"/>
@@ -3785,98 +3708,18 @@
                     </a:schemeClr>
                   </a:outerShdw>
                 </a:effectLst>
-                <a:latin typeface="华文行楷" panose="02010800040101010101" pitchFamily="2" charset="-122"/>
-                <a:ea typeface="华文行楷" panose="02010800040101010101" pitchFamily="2" charset="-122"/>
+                <a:latin typeface="华文新魏" panose="02010800040101010101" pitchFamily="2" charset="-122"/>
+                <a:ea typeface="华文新魏" panose="02010800040101010101" pitchFamily="2" charset="-122"/>
               </a:rPr>
-              <a:t>汐</a:t>
-            </a:r>
-            <a:endParaRPr lang="zh-CN" altLang="en-US" sz="16600" b="0" cap="none" spc="0" dirty="0">
-              <a:ln w="0"/>
-              <a:solidFill>
-                <a:schemeClr val="bg1"/>
-              </a:solidFill>
-              <a:effectLst>
-                <a:outerShdw blurRad="38100" dist="19050" dir="2700000" algn="tl" rotWithShape="0">
-                  <a:schemeClr val="dk1">
-                    <a:alpha val="40000"/>
-                  </a:schemeClr>
-                </a:outerShdw>
-              </a:effectLst>
-              <a:latin typeface="华文行楷" panose="02010800040101010101" pitchFamily="2" charset="-122"/>
-              <a:ea typeface="华文行楷" panose="02010800040101010101" pitchFamily="2" charset="-122"/>
-            </a:endParaRPr>
-          </a:p>
-        </p:txBody>
-      </p:sp>
-      <p:sp>
-        <p:nvSpPr>
-          <p:cNvPr id="7" name="矩形 6">
-            <a:extLst>
-              <a:ext uri="{FF2B5EF4-FFF2-40B4-BE49-F238E27FC236}">
-                <a16:creationId xmlns:a16="http://schemas.microsoft.com/office/drawing/2014/main" id="{9DFC419B-8D50-3186-7E8A-B82DF77C24C2}"/>
-              </a:ext>
-            </a:extLst>
-          </p:cNvPr>
-          <p:cNvSpPr/>
-          <p:nvPr/>
-        </p:nvSpPr>
-        <p:spPr>
-          <a:xfrm>
-            <a:off x="31656" y="3755147"/>
-            <a:ext cx="7109639" cy="1015663"/>
-          </a:xfrm>
-          <a:prstGeom prst="rect">
-            <a:avLst/>
-          </a:prstGeom>
-          <a:noFill/>
-        </p:spPr>
-        <p:txBody>
-          <a:bodyPr wrap="none" lIns="91440" tIns="45720" rIns="91440" bIns="45720">
-            <a:spAutoFit/>
-          </a:bodyPr>
-          <a:lstStyle/>
-          <a:p>
-            <a:pPr algn="ctr"/>
-            <a:r>
-              <a:rPr lang="zh-CN" altLang="en-US" sz="6000" dirty="0">
-                <a:ln w="0"/>
-                <a:solidFill>
-                  <a:schemeClr val="bg1"/>
-                </a:solidFill>
-                <a:effectLst>
-                  <a:outerShdw blurRad="38100" dist="19050" dir="2700000" algn="tl" rotWithShape="0">
-                    <a:schemeClr val="dk1">
-                      <a:alpha val="40000"/>
-                    </a:schemeClr>
-                  </a:outerShdw>
-                </a:effectLst>
-                <a:latin typeface="华文行楷" panose="02010800040101010101" pitchFamily="2" charset="-122"/>
-                <a:ea typeface="华文行楷" panose="02010800040101010101" pitchFamily="2" charset="-122"/>
-              </a:rPr>
-              <a:t>因子图优化相关问题</a:t>
-            </a:r>
-            <a:endParaRPr lang="zh-CN" altLang="en-US" sz="6000" b="0" cap="none" spc="0" dirty="0">
-              <a:ln w="0"/>
-              <a:solidFill>
-                <a:schemeClr val="bg1"/>
-              </a:solidFill>
-              <a:effectLst>
-                <a:outerShdw blurRad="38100" dist="19050" dir="2700000" algn="tl" rotWithShape="0">
-                  <a:schemeClr val="dk1">
-                    <a:alpha val="40000"/>
-                  </a:schemeClr>
-                </a:outerShdw>
-              </a:effectLst>
-              <a:latin typeface="华文行楷" panose="02010800040101010101" pitchFamily="2" charset="-122"/>
-              <a:ea typeface="华文行楷" panose="02010800040101010101" pitchFamily="2" charset="-122"/>
-            </a:endParaRPr>
+              <a:t>惯导学习整理</a:t>
+            </a:r>
           </a:p>
         </p:txBody>
       </p:sp>
     </p:spTree>
     <p:extLst>
       <p:ext uri="{BB962C8B-B14F-4D97-AF65-F5344CB8AC3E}">
-        <p14:creationId xmlns:p14="http://schemas.microsoft.com/office/powerpoint/2010/main" val="1162833254"/>
+        <p14:creationId xmlns:p14="http://schemas.microsoft.com/office/powerpoint/2010/main" val="2595486900"/>
       </p:ext>
     </p:extLst>
   </p:cSld>
@@ -3931,7 +3774,7 @@
         </p:blipFill>
         <p:spPr>
           <a:xfrm>
-            <a:off x="1649691" y="966606"/>
+            <a:off x="1846291" y="859157"/>
             <a:ext cx="5581385" cy="3139529"/>
           </a:xfrm>
           <a:prstGeom prst="rect">
@@ -4000,7 +3843,7 @@
         </p:blipFill>
         <p:spPr>
           <a:xfrm>
-            <a:off x="1074418" y="4372206"/>
+            <a:off x="176330" y="3206996"/>
             <a:ext cx="7106672" cy="3743181"/>
           </a:xfrm>
           <a:prstGeom prst="rect">
@@ -4025,8 +3868,8 @@
         </p:nvSpPr>
         <p:spPr>
           <a:xfrm>
-            <a:off x="7320557" y="2132671"/>
-            <a:ext cx="5032148" cy="1569660"/>
+            <a:off x="1998691" y="1173195"/>
+            <a:ext cx="2313454" cy="2646878"/>
           </a:xfrm>
           <a:prstGeom prst="rect">
             <a:avLst/>
@@ -4041,7 +3884,7 @@
           <a:p>
             <a:pPr algn="ctr"/>
             <a:r>
-              <a:rPr lang="en-US" altLang="zh-CN" sz="9600" dirty="0">
+              <a:rPr lang="zh-CN" altLang="en-US" sz="16600" dirty="0">
                 <a:ln w="0"/>
                 <a:solidFill>
                   <a:schemeClr val="bg1"/>
@@ -4056,27 +3899,9 @@
                 <a:latin typeface="华文行楷" panose="02010800040101010101" pitchFamily="2" charset="-122"/>
                 <a:ea typeface="华文行楷" panose="02010800040101010101" pitchFamily="2" charset="-122"/>
               </a:rPr>
-              <a:t>C++</a:t>
-            </a:r>
-            <a:r>
-              <a:rPr lang="zh-CN" altLang="en-US" sz="9600" dirty="0">
-                <a:ln w="0"/>
-                <a:solidFill>
-                  <a:schemeClr val="bg1"/>
-                </a:solidFill>
-                <a:effectLst>
-                  <a:outerShdw blurRad="38100" dist="19050" dir="2700000" algn="tl" rotWithShape="0">
-                    <a:schemeClr val="dk1">
-                      <a:alpha val="40000"/>
-                    </a:schemeClr>
-                  </a:outerShdw>
-                </a:effectLst>
-                <a:latin typeface="华文行楷" panose="02010800040101010101" pitchFamily="2" charset="-122"/>
-                <a:ea typeface="华文行楷" panose="02010800040101010101" pitchFamily="2" charset="-122"/>
-              </a:rPr>
-              <a:t>学习</a:t>
-            </a:r>
-            <a:endParaRPr lang="zh-CN" altLang="en-US" sz="9600" b="0" cap="none" spc="0" dirty="0">
+              <a:t>汐</a:t>
+            </a:r>
+            <a:endParaRPr lang="zh-CN" altLang="en-US" sz="16600" b="0" cap="none" spc="0" dirty="0">
               <a:ln w="0"/>
               <a:solidFill>
                 <a:schemeClr val="bg1"/>
@@ -4108,7 +3933,7 @@
         </p:nvSpPr>
         <p:spPr>
           <a:xfrm>
-            <a:off x="971814" y="4727097"/>
+            <a:off x="31656" y="3755147"/>
             <a:ext cx="7109639" cy="1015663"/>
           </a:xfrm>
           <a:prstGeom prst="rect">
@@ -4159,123 +3984,10 @@
           </a:p>
         </p:txBody>
       </p:sp>
-      <p:pic>
-        <p:nvPicPr>
-          <p:cNvPr id="5" name="图片 4">
-            <a:extLst>
-              <a:ext uri="{FF2B5EF4-FFF2-40B4-BE49-F238E27FC236}">
-                <a16:creationId xmlns:a16="http://schemas.microsoft.com/office/drawing/2014/main" id="{6176AF20-7AED-6942-370D-59501BBD8954}"/>
-              </a:ext>
-            </a:extLst>
-          </p:cNvPr>
-          <p:cNvPicPr>
-            <a:picLocks noChangeAspect="1"/>
-          </p:cNvPicPr>
-          <p:nvPr/>
-        </p:nvPicPr>
-        <p:blipFill>
-          <a:blip r:embed="rId4"/>
-          <a:stretch>
-            <a:fillRect/>
-          </a:stretch>
-        </p:blipFill>
-        <p:spPr>
-          <a:xfrm>
-            <a:off x="1451725" y="1078270"/>
-            <a:ext cx="5295939" cy="3976717"/>
-          </a:xfrm>
-          <a:prstGeom prst="rect">
-            <a:avLst/>
-          </a:prstGeom>
-        </p:spPr>
-      </p:pic>
-      <p:sp>
-        <p:nvSpPr>
-          <p:cNvPr id="8" name="矩形 7">
-            <a:extLst>
-              <a:ext uri="{FF2B5EF4-FFF2-40B4-BE49-F238E27FC236}">
-                <a16:creationId xmlns:a16="http://schemas.microsoft.com/office/drawing/2014/main" id="{C1A0DEB2-34EA-3B5E-A988-CA7490DBF046}"/>
-              </a:ext>
-            </a:extLst>
-          </p:cNvPr>
-          <p:cNvSpPr/>
-          <p:nvPr/>
-        </p:nvSpPr>
-        <p:spPr>
-          <a:xfrm>
-            <a:off x="1935136" y="1999579"/>
-            <a:ext cx="5032148" cy="1569660"/>
-          </a:xfrm>
-          <a:prstGeom prst="rect">
-            <a:avLst/>
-          </a:prstGeom>
-          <a:noFill/>
-        </p:spPr>
-        <p:txBody>
-          <a:bodyPr wrap="none" lIns="91440" tIns="45720" rIns="91440" bIns="45720">
-            <a:spAutoFit/>
-          </a:bodyPr>
-          <a:lstStyle/>
-          <a:p>
-            <a:pPr algn="ctr"/>
-            <a:r>
-              <a:rPr lang="en-US" altLang="zh-CN" sz="9600" dirty="0">
-                <a:ln w="0"/>
-                <a:solidFill>
-                  <a:schemeClr val="bg1"/>
-                </a:solidFill>
-                <a:effectLst>
-                  <a:outerShdw blurRad="38100" dist="19050" dir="2700000" algn="tl" rotWithShape="0">
-                    <a:schemeClr val="dk1">
-                      <a:alpha val="40000"/>
-                    </a:schemeClr>
-                  </a:outerShdw>
-                </a:effectLst>
-                <a:latin typeface="华文行楷" panose="02010800040101010101" pitchFamily="2" charset="-122"/>
-                <a:ea typeface="华文行楷" panose="02010800040101010101" pitchFamily="2" charset="-122"/>
-              </a:rPr>
-              <a:t>C++</a:t>
-            </a:r>
-            <a:r>
-              <a:rPr lang="zh-CN" altLang="en-US" sz="9600" dirty="0">
-                <a:ln w="0"/>
-                <a:solidFill>
-                  <a:schemeClr val="bg1"/>
-                </a:solidFill>
-                <a:effectLst>
-                  <a:outerShdw blurRad="38100" dist="19050" dir="2700000" algn="tl" rotWithShape="0">
-                    <a:schemeClr val="dk1">
-                      <a:alpha val="40000"/>
-                    </a:schemeClr>
-                  </a:outerShdw>
-                </a:effectLst>
-                <a:latin typeface="华文行楷" panose="02010800040101010101" pitchFamily="2" charset="-122"/>
-                <a:ea typeface="华文行楷" panose="02010800040101010101" pitchFamily="2" charset="-122"/>
-              </a:rPr>
-              <a:t>学习</a:t>
-            </a:r>
-            <a:endParaRPr lang="zh-CN" altLang="en-US" sz="9600" b="0" cap="none" spc="0" dirty="0">
-              <a:ln w="0"/>
-              <a:solidFill>
-                <a:schemeClr val="bg1"/>
-              </a:solidFill>
-              <a:effectLst>
-                <a:outerShdw blurRad="38100" dist="19050" dir="2700000" algn="tl" rotWithShape="0">
-                  <a:schemeClr val="dk1">
-                    <a:alpha val="40000"/>
-                  </a:schemeClr>
-                </a:outerShdw>
-              </a:effectLst>
-              <a:latin typeface="华文行楷" panose="02010800040101010101" pitchFamily="2" charset="-122"/>
-              <a:ea typeface="华文行楷" panose="02010800040101010101" pitchFamily="2" charset="-122"/>
-            </a:endParaRPr>
-          </a:p>
-        </p:txBody>
-      </p:sp>
     </p:spTree>
     <p:extLst>
       <p:ext uri="{BB962C8B-B14F-4D97-AF65-F5344CB8AC3E}">
-        <p14:creationId xmlns:p14="http://schemas.microsoft.com/office/powerpoint/2010/main" val="3818139286"/>
+        <p14:creationId xmlns:p14="http://schemas.microsoft.com/office/powerpoint/2010/main" val="1162833254"/>
       </p:ext>
     </p:extLst>
   </p:cSld>
@@ -4304,10 +4016,10 @@
       </p:grpSpPr>
       <p:pic>
         <p:nvPicPr>
-          <p:cNvPr id="4" name="图片 3">
-            <a:extLst>
-              <a:ext uri="{FF2B5EF4-FFF2-40B4-BE49-F238E27FC236}">
-                <a16:creationId xmlns:a16="http://schemas.microsoft.com/office/drawing/2014/main" id="{1A782AC0-43C4-AC14-E7D9-02DC59E93AE1}"/>
+          <p:cNvPr id="2" name="图片 1">
+            <a:extLst>
+              <a:ext uri="{FF2B5EF4-FFF2-40B4-BE49-F238E27FC236}">
+                <a16:creationId xmlns:a16="http://schemas.microsoft.com/office/drawing/2014/main" id="{18307BB2-8510-23D6-2FF7-2913C9E5358A}"/>
               </a:ext>
             </a:extLst>
           </p:cNvPr>
@@ -4317,27 +4029,105 @@
           <p:nvPr/>
         </p:nvPicPr>
         <p:blipFill>
-          <a:blip r:embed="rId2"/>
+          <a:blip r:embed="rId2">
+            <a:extLst>
+              <a:ext uri="{28A0092B-C50C-407E-A947-70E740481C1C}">
+                <a14:useLocalDpi xmlns:a14="http://schemas.microsoft.com/office/drawing/2010/main" val="0"/>
+              </a:ext>
+            </a:extLst>
+          </a:blip>
           <a:stretch>
             <a:fillRect/>
           </a:stretch>
         </p:blipFill>
         <p:spPr>
           <a:xfrm>
-            <a:off x="2509213" y="1199565"/>
-            <a:ext cx="6634786" cy="4878180"/>
+            <a:off x="1649691" y="966606"/>
+            <a:ext cx="5581385" cy="3139529"/>
+          </a:xfrm>
+          <a:prstGeom prst="rect">
+            <a:avLst/>
+          </a:prstGeom>
+          <a:effectLst>
+            <a:reflection endPos="0" dist="50800" dir="5400000" sy="-100000" algn="bl" rotWithShape="0"/>
+          </a:effectLst>
+        </p:spPr>
+      </p:pic>
+      <p:pic>
+        <p:nvPicPr>
+          <p:cNvPr id="3" name="图片 2">
+            <a:extLst>
+              <a:ext uri="{FF2B5EF4-FFF2-40B4-BE49-F238E27FC236}">
+                <a16:creationId xmlns:a16="http://schemas.microsoft.com/office/drawing/2014/main" id="{5F39A048-5F64-38B5-51DA-55E7151EC42B}"/>
+              </a:ext>
+            </a:extLst>
+          </p:cNvPr>
+          <p:cNvPicPr>
+            <a:picLocks noChangeAspect="1"/>
+          </p:cNvPicPr>
+          <p:nvPr/>
+        </p:nvPicPr>
+        <p:blipFill>
+          <a:blip r:embed="rId3"/>
+          <a:stretch>
+            <a:fillRect/>
+          </a:stretch>
+        </p:blipFill>
+        <p:spPr>
+          <a:xfrm>
+            <a:off x="8263045" y="1829135"/>
+            <a:ext cx="1471623" cy="1414473"/>
           </a:xfrm>
           <a:prstGeom prst="rect">
             <a:avLst/>
           </a:prstGeom>
         </p:spPr>
       </p:pic>
-      <p:sp>
-        <p:nvSpPr>
-          <p:cNvPr id="5" name="矩形 4">
-            <a:extLst>
-              <a:ext uri="{FF2B5EF4-FFF2-40B4-BE49-F238E27FC236}">
-                <a16:creationId xmlns:a16="http://schemas.microsoft.com/office/drawing/2014/main" id="{5133D3C1-5EC9-B360-36E9-0F29F16A3DD9}"/>
+      <p:pic>
+        <p:nvPicPr>
+          <p:cNvPr id="4" name="图片 3">
+            <a:extLst>
+              <a:ext uri="{FF2B5EF4-FFF2-40B4-BE49-F238E27FC236}">
+                <a16:creationId xmlns:a16="http://schemas.microsoft.com/office/drawing/2014/main" id="{3E0C5581-ED1C-5AE7-071F-E94B7AB69402}"/>
+              </a:ext>
+            </a:extLst>
+          </p:cNvPr>
+          <p:cNvPicPr>
+            <a:picLocks noChangeAspect="1"/>
+          </p:cNvPicPr>
+          <p:nvPr/>
+        </p:nvPicPr>
+        <p:blipFill>
+          <a:blip r:embed="rId2">
+            <a:extLst>
+              <a:ext uri="{28A0092B-C50C-407E-A947-70E740481C1C}">
+                <a14:useLocalDpi xmlns:a14="http://schemas.microsoft.com/office/drawing/2010/main" val="0"/>
+              </a:ext>
+            </a:extLst>
+          </a:blip>
+          <a:stretch>
+            <a:fillRect/>
+          </a:stretch>
+        </p:blipFill>
+        <p:spPr>
+          <a:xfrm>
+            <a:off x="1074418" y="4372206"/>
+            <a:ext cx="7106672" cy="3743181"/>
+          </a:xfrm>
+          <a:prstGeom prst="rect">
+            <a:avLst/>
+          </a:prstGeom>
+          <a:effectLst>
+            <a:reflection endPos="0" dist="50800" dir="5400000" sy="-100000" algn="bl" rotWithShape="0"/>
+          </a:effectLst>
+        </p:spPr>
+      </p:pic>
+      <p:sp>
+        <p:nvSpPr>
+          <p:cNvPr id="6" name="矩形 5">
+            <a:extLst>
+              <a:ext uri="{FF2B5EF4-FFF2-40B4-BE49-F238E27FC236}">
+                <a16:creationId xmlns:a16="http://schemas.microsoft.com/office/drawing/2014/main" id="{4E58FB89-5202-0383-E3B9-99B492940378}"/>
               </a:ext>
             </a:extLst>
           </p:cNvPr>
@@ -4346,8 +4136,8 @@
         </p:nvSpPr>
         <p:spPr>
           <a:xfrm>
-            <a:off x="5158105" y="4042721"/>
-            <a:ext cx="2262158" cy="923330"/>
+            <a:off x="7320557" y="2132671"/>
+            <a:ext cx="5032148" cy="1569660"/>
           </a:xfrm>
           <a:prstGeom prst="rect">
             <a:avLst/>
@@ -4362,10 +4152,10 @@
           <a:p>
             <a:pPr algn="ctr"/>
             <a:r>
-              <a:rPr lang="zh-CN" altLang="en-US" sz="5400" b="0" cap="none" spc="0" dirty="0">
+              <a:rPr lang="en-US" altLang="zh-CN" sz="9600" dirty="0">
                 <a:ln w="0"/>
                 <a:solidFill>
-                  <a:schemeClr val="tx1"/>
+                  <a:schemeClr val="bg1"/>
                 </a:solidFill>
                 <a:effectLst>
                   <a:outerShdw blurRad="38100" dist="19050" dir="2700000" algn="tl" rotWithShape="0">
@@ -4377,15 +4167,226 @@
                 <a:latin typeface="华文行楷" panose="02010800040101010101" pitchFamily="2" charset="-122"/>
                 <a:ea typeface="华文行楷" panose="02010800040101010101" pitchFamily="2" charset="-122"/>
               </a:rPr>
-              <a:t>碎碎念</a:t>
-            </a:r>
+              <a:t>C++</a:t>
+            </a:r>
+            <a:r>
+              <a:rPr lang="zh-CN" altLang="en-US" sz="9600" dirty="0">
+                <a:ln w="0"/>
+                <a:solidFill>
+                  <a:schemeClr val="bg1"/>
+                </a:solidFill>
+                <a:effectLst>
+                  <a:outerShdw blurRad="38100" dist="19050" dir="2700000" algn="tl" rotWithShape="0">
+                    <a:schemeClr val="dk1">
+                      <a:alpha val="40000"/>
+                    </a:schemeClr>
+                  </a:outerShdw>
+                </a:effectLst>
+                <a:latin typeface="华文行楷" panose="02010800040101010101" pitchFamily="2" charset="-122"/>
+                <a:ea typeface="华文行楷" panose="02010800040101010101" pitchFamily="2" charset="-122"/>
+              </a:rPr>
+              <a:t>学习</a:t>
+            </a:r>
+            <a:endParaRPr lang="zh-CN" altLang="en-US" sz="9600" b="0" cap="none" spc="0" dirty="0">
+              <a:ln w="0"/>
+              <a:solidFill>
+                <a:schemeClr val="bg1"/>
+              </a:solidFill>
+              <a:effectLst>
+                <a:outerShdw blurRad="38100" dist="19050" dir="2700000" algn="tl" rotWithShape="0">
+                  <a:schemeClr val="dk1">
+                    <a:alpha val="40000"/>
+                  </a:schemeClr>
+                </a:outerShdw>
+              </a:effectLst>
+              <a:latin typeface="华文行楷" panose="02010800040101010101" pitchFamily="2" charset="-122"/>
+              <a:ea typeface="华文行楷" panose="02010800040101010101" pitchFamily="2" charset="-122"/>
+            </a:endParaRPr>
+          </a:p>
+        </p:txBody>
+      </p:sp>
+      <p:sp>
+        <p:nvSpPr>
+          <p:cNvPr id="7" name="矩形 6">
+            <a:extLst>
+              <a:ext uri="{FF2B5EF4-FFF2-40B4-BE49-F238E27FC236}">
+                <a16:creationId xmlns:a16="http://schemas.microsoft.com/office/drawing/2014/main" id="{9DFC419B-8D50-3186-7E8A-B82DF77C24C2}"/>
+              </a:ext>
+            </a:extLst>
+          </p:cNvPr>
+          <p:cNvSpPr/>
+          <p:nvPr/>
+        </p:nvSpPr>
+        <p:spPr>
+          <a:xfrm>
+            <a:off x="971814" y="4727097"/>
+            <a:ext cx="7109639" cy="1015663"/>
+          </a:xfrm>
+          <a:prstGeom prst="rect">
+            <a:avLst/>
+          </a:prstGeom>
+          <a:noFill/>
+        </p:spPr>
+        <p:txBody>
+          <a:bodyPr wrap="none" lIns="91440" tIns="45720" rIns="91440" bIns="45720">
+            <a:spAutoFit/>
+          </a:bodyPr>
+          <a:lstStyle/>
+          <a:p>
+            <a:pPr algn="ctr"/>
+            <a:r>
+              <a:rPr lang="zh-CN" altLang="en-US" sz="6000" dirty="0">
+                <a:ln w="0"/>
+                <a:solidFill>
+                  <a:schemeClr val="bg1"/>
+                </a:solidFill>
+                <a:effectLst>
+                  <a:outerShdw blurRad="38100" dist="19050" dir="2700000" algn="tl" rotWithShape="0">
+                    <a:schemeClr val="dk1">
+                      <a:alpha val="40000"/>
+                    </a:schemeClr>
+                  </a:outerShdw>
+                </a:effectLst>
+                <a:latin typeface="华文行楷" panose="02010800040101010101" pitchFamily="2" charset="-122"/>
+                <a:ea typeface="华文行楷" panose="02010800040101010101" pitchFamily="2" charset="-122"/>
+              </a:rPr>
+              <a:t>因子图优化相关问题</a:t>
+            </a:r>
+            <a:endParaRPr lang="zh-CN" altLang="en-US" sz="6000" b="0" cap="none" spc="0" dirty="0">
+              <a:ln w="0"/>
+              <a:solidFill>
+                <a:schemeClr val="bg1"/>
+              </a:solidFill>
+              <a:effectLst>
+                <a:outerShdw blurRad="38100" dist="19050" dir="2700000" algn="tl" rotWithShape="0">
+                  <a:schemeClr val="dk1">
+                    <a:alpha val="40000"/>
+                  </a:schemeClr>
+                </a:outerShdw>
+              </a:effectLst>
+              <a:latin typeface="华文行楷" panose="02010800040101010101" pitchFamily="2" charset="-122"/>
+              <a:ea typeface="华文行楷" panose="02010800040101010101" pitchFamily="2" charset="-122"/>
+            </a:endParaRPr>
+          </a:p>
+        </p:txBody>
+      </p:sp>
+      <p:pic>
+        <p:nvPicPr>
+          <p:cNvPr id="5" name="图片 4">
+            <a:extLst>
+              <a:ext uri="{FF2B5EF4-FFF2-40B4-BE49-F238E27FC236}">
+                <a16:creationId xmlns:a16="http://schemas.microsoft.com/office/drawing/2014/main" id="{6176AF20-7AED-6942-370D-59501BBD8954}"/>
+              </a:ext>
+            </a:extLst>
+          </p:cNvPr>
+          <p:cNvPicPr>
+            <a:picLocks noChangeAspect="1"/>
+          </p:cNvPicPr>
+          <p:nvPr/>
+        </p:nvPicPr>
+        <p:blipFill>
+          <a:blip r:embed="rId4"/>
+          <a:stretch>
+            <a:fillRect/>
+          </a:stretch>
+        </p:blipFill>
+        <p:spPr>
+          <a:xfrm>
+            <a:off x="1451725" y="1078270"/>
+            <a:ext cx="5295939" cy="3976717"/>
+          </a:xfrm>
+          <a:prstGeom prst="rect">
+            <a:avLst/>
+          </a:prstGeom>
+        </p:spPr>
+      </p:pic>
+      <p:sp>
+        <p:nvSpPr>
+          <p:cNvPr id="8" name="矩形 7">
+            <a:extLst>
+              <a:ext uri="{FF2B5EF4-FFF2-40B4-BE49-F238E27FC236}">
+                <a16:creationId xmlns:a16="http://schemas.microsoft.com/office/drawing/2014/main" id="{C1A0DEB2-34EA-3B5E-A988-CA7490DBF046}"/>
+              </a:ext>
+            </a:extLst>
+          </p:cNvPr>
+          <p:cNvSpPr/>
+          <p:nvPr/>
+        </p:nvSpPr>
+        <p:spPr>
+          <a:xfrm>
+            <a:off x="1935136" y="1999579"/>
+            <a:ext cx="5032148" cy="1569660"/>
+          </a:xfrm>
+          <a:prstGeom prst="rect">
+            <a:avLst/>
+          </a:prstGeom>
+          <a:noFill/>
+        </p:spPr>
+        <p:txBody>
+          <a:bodyPr wrap="none" lIns="91440" tIns="45720" rIns="91440" bIns="45720">
+            <a:spAutoFit/>
+          </a:bodyPr>
+          <a:lstStyle/>
+          <a:p>
+            <a:pPr algn="ctr"/>
+            <a:r>
+              <a:rPr lang="en-US" altLang="zh-CN" sz="9600" dirty="0">
+                <a:ln w="0"/>
+                <a:solidFill>
+                  <a:schemeClr val="bg1"/>
+                </a:solidFill>
+                <a:effectLst>
+                  <a:outerShdw blurRad="38100" dist="19050" dir="2700000" algn="tl" rotWithShape="0">
+                    <a:schemeClr val="dk1">
+                      <a:alpha val="40000"/>
+                    </a:schemeClr>
+                  </a:outerShdw>
+                </a:effectLst>
+                <a:latin typeface="华文行楷" panose="02010800040101010101" pitchFamily="2" charset="-122"/>
+                <a:ea typeface="华文行楷" panose="02010800040101010101" pitchFamily="2" charset="-122"/>
+              </a:rPr>
+              <a:t>C++</a:t>
+            </a:r>
+            <a:r>
+              <a:rPr lang="zh-CN" altLang="en-US" sz="9600" dirty="0">
+                <a:ln w="0"/>
+                <a:solidFill>
+                  <a:schemeClr val="bg1"/>
+                </a:solidFill>
+                <a:effectLst>
+                  <a:outerShdw blurRad="38100" dist="19050" dir="2700000" algn="tl" rotWithShape="0">
+                    <a:schemeClr val="dk1">
+                      <a:alpha val="40000"/>
+                    </a:schemeClr>
+                  </a:outerShdw>
+                </a:effectLst>
+                <a:latin typeface="华文行楷" panose="02010800040101010101" pitchFamily="2" charset="-122"/>
+                <a:ea typeface="华文行楷" panose="02010800040101010101" pitchFamily="2" charset="-122"/>
+              </a:rPr>
+              <a:t>学习</a:t>
+            </a:r>
+            <a:endParaRPr lang="zh-CN" altLang="en-US" sz="9600" b="0" cap="none" spc="0" dirty="0">
+              <a:ln w="0"/>
+              <a:solidFill>
+                <a:schemeClr val="bg1"/>
+              </a:solidFill>
+              <a:effectLst>
+                <a:outerShdw blurRad="38100" dist="19050" dir="2700000" algn="tl" rotWithShape="0">
+                  <a:schemeClr val="dk1">
+                    <a:alpha val="40000"/>
+                  </a:schemeClr>
+                </a:outerShdw>
+              </a:effectLst>
+              <a:latin typeface="华文行楷" panose="02010800040101010101" pitchFamily="2" charset="-122"/>
+              <a:ea typeface="华文行楷" panose="02010800040101010101" pitchFamily="2" charset="-122"/>
+            </a:endParaRPr>
           </a:p>
         </p:txBody>
       </p:sp>
     </p:spTree>
     <p:extLst>
       <p:ext uri="{BB962C8B-B14F-4D97-AF65-F5344CB8AC3E}">
-        <p14:creationId xmlns:p14="http://schemas.microsoft.com/office/powerpoint/2010/main" val="3264562608"/>
+        <p14:creationId xmlns:p14="http://schemas.microsoft.com/office/powerpoint/2010/main" val="3818139286"/>
       </p:ext>
     </p:extLst>
   </p:cSld>
@@ -4414,6 +4415,116 @@
       </p:grpSpPr>
       <p:pic>
         <p:nvPicPr>
+          <p:cNvPr id="4" name="图片 3">
+            <a:extLst>
+              <a:ext uri="{FF2B5EF4-FFF2-40B4-BE49-F238E27FC236}">
+                <a16:creationId xmlns:a16="http://schemas.microsoft.com/office/drawing/2014/main" id="{1A782AC0-43C4-AC14-E7D9-02DC59E93AE1}"/>
+              </a:ext>
+            </a:extLst>
+          </p:cNvPr>
+          <p:cNvPicPr>
+            <a:picLocks noChangeAspect="1"/>
+          </p:cNvPicPr>
+          <p:nvPr/>
+        </p:nvPicPr>
+        <p:blipFill>
+          <a:blip r:embed="rId2"/>
+          <a:stretch>
+            <a:fillRect/>
+          </a:stretch>
+        </p:blipFill>
+        <p:spPr>
+          <a:xfrm>
+            <a:off x="2509213" y="1199565"/>
+            <a:ext cx="6634786" cy="4878180"/>
+          </a:xfrm>
+          <a:prstGeom prst="rect">
+            <a:avLst/>
+          </a:prstGeom>
+        </p:spPr>
+      </p:pic>
+      <p:sp>
+        <p:nvSpPr>
+          <p:cNvPr id="5" name="矩形 4">
+            <a:extLst>
+              <a:ext uri="{FF2B5EF4-FFF2-40B4-BE49-F238E27FC236}">
+                <a16:creationId xmlns:a16="http://schemas.microsoft.com/office/drawing/2014/main" id="{5133D3C1-5EC9-B360-36E9-0F29F16A3DD9}"/>
+              </a:ext>
+            </a:extLst>
+          </p:cNvPr>
+          <p:cNvSpPr/>
+          <p:nvPr/>
+        </p:nvSpPr>
+        <p:spPr>
+          <a:xfrm>
+            <a:off x="5158105" y="4042721"/>
+            <a:ext cx="2262158" cy="923330"/>
+          </a:xfrm>
+          <a:prstGeom prst="rect">
+            <a:avLst/>
+          </a:prstGeom>
+          <a:noFill/>
+        </p:spPr>
+        <p:txBody>
+          <a:bodyPr wrap="none" lIns="91440" tIns="45720" rIns="91440" bIns="45720">
+            <a:spAutoFit/>
+          </a:bodyPr>
+          <a:lstStyle/>
+          <a:p>
+            <a:pPr algn="ctr"/>
+            <a:r>
+              <a:rPr lang="zh-CN" altLang="en-US" sz="5400" b="0" cap="none" spc="0" dirty="0">
+                <a:ln w="0"/>
+                <a:solidFill>
+                  <a:schemeClr val="tx1"/>
+                </a:solidFill>
+                <a:effectLst>
+                  <a:outerShdw blurRad="38100" dist="19050" dir="2700000" algn="tl" rotWithShape="0">
+                    <a:schemeClr val="dk1">
+                      <a:alpha val="40000"/>
+                    </a:schemeClr>
+                  </a:outerShdw>
+                </a:effectLst>
+                <a:latin typeface="华文行楷" panose="02010800040101010101" pitchFamily="2" charset="-122"/>
+                <a:ea typeface="华文行楷" panose="02010800040101010101" pitchFamily="2" charset="-122"/>
+              </a:rPr>
+              <a:t>碎碎念</a:t>
+            </a:r>
+          </a:p>
+        </p:txBody>
+      </p:sp>
+    </p:spTree>
+    <p:extLst>
+      <p:ext uri="{BB962C8B-B14F-4D97-AF65-F5344CB8AC3E}">
+        <p14:creationId xmlns:p14="http://schemas.microsoft.com/office/powerpoint/2010/main" val="3264562608"/>
+      </p:ext>
+    </p:extLst>
+  </p:cSld>
+  <p:clrMapOvr>
+    <a:masterClrMapping/>
+  </p:clrMapOvr>
+</p:sld>
+</file>
+
+<file path=ppt/slides/slide7.xml><?xml version="1.0" encoding="utf-8"?>
+<p:sld xmlns:a="http://schemas.openxmlformats.org/drawingml/2006/main" xmlns:r="http://schemas.openxmlformats.org/officeDocument/2006/relationships" xmlns:p="http://schemas.openxmlformats.org/presentationml/2006/main">
+  <p:cSld>
+    <p:spTree>
+      <p:nvGrpSpPr>
+        <p:cNvPr id="1" name=""/>
+        <p:cNvGrpSpPr/>
+        <p:nvPr/>
+      </p:nvGrpSpPr>
+      <p:grpSpPr>
+        <a:xfrm>
+          <a:off x="0" y="0"/>
+          <a:ext cx="0" cy="0"/>
+          <a:chOff x="0" y="0"/>
+          <a:chExt cx="0" cy="0"/>
+        </a:xfrm>
+      </p:grpSpPr>
+      <p:pic>
+        <p:nvPicPr>
           <p:cNvPr id="2" name="图片 1">
             <a:extLst>
               <a:ext uri="{FF2B5EF4-FFF2-40B4-BE49-F238E27FC236}">
@@ -4505,7 +4616,7 @@
 </p:sld>
 </file>
 
-<file path=ppt/slides/slide7.xml><?xml version="1.0" encoding="utf-8"?>
+<file path=ppt/slides/slide8.xml><?xml version="1.0" encoding="utf-8"?>
 <p:sld xmlns:a="http://schemas.openxmlformats.org/drawingml/2006/main" xmlns:r="http://schemas.openxmlformats.org/officeDocument/2006/relationships" xmlns:p="http://schemas.openxmlformats.org/presentationml/2006/main">
   <p:cSld>
     <p:spTree>

</xml_diff>

<commit_message>
Site updated: 2025-05-21 15:05:29
</commit_message>
<xml_diff>
--- a/img/pic.pptx
+++ b/img/pic.pptx
@@ -7,12 +7,11 @@
   <p:sldIdLst>
     <p:sldId id="256" r:id="rId2"/>
     <p:sldId id="261" r:id="rId3"/>
-    <p:sldId id="263" r:id="rId4"/>
-    <p:sldId id="257" r:id="rId5"/>
-    <p:sldId id="258" r:id="rId6"/>
-    <p:sldId id="259" r:id="rId7"/>
-    <p:sldId id="260" r:id="rId8"/>
-    <p:sldId id="262" r:id="rId9"/>
+    <p:sldId id="257" r:id="rId4"/>
+    <p:sldId id="258" r:id="rId5"/>
+    <p:sldId id="259" r:id="rId6"/>
+    <p:sldId id="260" r:id="rId7"/>
+    <p:sldId id="262" r:id="rId8"/>
   </p:sldIdLst>
   <p:sldSz cx="12192000" cy="6858000"/>
   <p:notesSz cx="6858000" cy="9144000"/>
@@ -266,7 +265,7 @@
           <a:p>
             <a:fld id="{58A749B2-B91D-4C1A-83E6-7AD02F774933}" type="datetimeFigureOut">
               <a:rPr lang="zh-CN" altLang="en-US" smtClean="0"/>
-              <a:t>2024/9/15</a:t>
+              <a:t>2024/9/6</a:t>
             </a:fld>
             <a:endParaRPr lang="zh-CN" altLang="en-US"/>
           </a:p>
@@ -464,7 +463,7 @@
           <a:p>
             <a:fld id="{58A749B2-B91D-4C1A-83E6-7AD02F774933}" type="datetimeFigureOut">
               <a:rPr lang="zh-CN" altLang="en-US" smtClean="0"/>
-              <a:t>2024/9/15</a:t>
+              <a:t>2024/9/6</a:t>
             </a:fld>
             <a:endParaRPr lang="zh-CN" altLang="en-US"/>
           </a:p>
@@ -672,7 +671,7 @@
           <a:p>
             <a:fld id="{58A749B2-B91D-4C1A-83E6-7AD02F774933}" type="datetimeFigureOut">
               <a:rPr lang="zh-CN" altLang="en-US" smtClean="0"/>
-              <a:t>2024/9/15</a:t>
+              <a:t>2024/9/6</a:t>
             </a:fld>
             <a:endParaRPr lang="zh-CN" altLang="en-US"/>
           </a:p>
@@ -870,7 +869,7 @@
           <a:p>
             <a:fld id="{58A749B2-B91D-4C1A-83E6-7AD02F774933}" type="datetimeFigureOut">
               <a:rPr lang="zh-CN" altLang="en-US" smtClean="0"/>
-              <a:t>2024/9/15</a:t>
+              <a:t>2024/9/6</a:t>
             </a:fld>
             <a:endParaRPr lang="zh-CN" altLang="en-US"/>
           </a:p>
@@ -1145,7 +1144,7 @@
           <a:p>
             <a:fld id="{58A749B2-B91D-4C1A-83E6-7AD02F774933}" type="datetimeFigureOut">
               <a:rPr lang="zh-CN" altLang="en-US" smtClean="0"/>
-              <a:t>2024/9/15</a:t>
+              <a:t>2024/9/6</a:t>
             </a:fld>
             <a:endParaRPr lang="zh-CN" altLang="en-US"/>
           </a:p>
@@ -1410,7 +1409,7 @@
           <a:p>
             <a:fld id="{58A749B2-B91D-4C1A-83E6-7AD02F774933}" type="datetimeFigureOut">
               <a:rPr lang="zh-CN" altLang="en-US" smtClean="0"/>
-              <a:t>2024/9/15</a:t>
+              <a:t>2024/9/6</a:t>
             </a:fld>
             <a:endParaRPr lang="zh-CN" altLang="en-US"/>
           </a:p>
@@ -1822,7 +1821,7 @@
           <a:p>
             <a:fld id="{58A749B2-B91D-4C1A-83E6-7AD02F774933}" type="datetimeFigureOut">
               <a:rPr lang="zh-CN" altLang="en-US" smtClean="0"/>
-              <a:t>2024/9/15</a:t>
+              <a:t>2024/9/6</a:t>
             </a:fld>
             <a:endParaRPr lang="zh-CN" altLang="en-US"/>
           </a:p>
@@ -1963,7 +1962,7 @@
           <a:p>
             <a:fld id="{58A749B2-B91D-4C1A-83E6-7AD02F774933}" type="datetimeFigureOut">
               <a:rPr lang="zh-CN" altLang="en-US" smtClean="0"/>
-              <a:t>2024/9/15</a:t>
+              <a:t>2024/9/6</a:t>
             </a:fld>
             <a:endParaRPr lang="zh-CN" altLang="en-US"/>
           </a:p>
@@ -2076,7 +2075,7 @@
           <a:p>
             <a:fld id="{58A749B2-B91D-4C1A-83E6-7AD02F774933}" type="datetimeFigureOut">
               <a:rPr lang="zh-CN" altLang="en-US" smtClean="0"/>
-              <a:t>2024/9/15</a:t>
+              <a:t>2024/9/6</a:t>
             </a:fld>
             <a:endParaRPr lang="zh-CN" altLang="en-US"/>
           </a:p>
@@ -2387,7 +2386,7 @@
           <a:p>
             <a:fld id="{58A749B2-B91D-4C1A-83E6-7AD02F774933}" type="datetimeFigureOut">
               <a:rPr lang="zh-CN" altLang="en-US" smtClean="0"/>
-              <a:t>2024/9/15</a:t>
+              <a:t>2024/9/6</a:t>
             </a:fld>
             <a:endParaRPr lang="zh-CN" altLang="en-US"/>
           </a:p>
@@ -2675,7 +2674,7 @@
           <a:p>
             <a:fld id="{58A749B2-B91D-4C1A-83E6-7AD02F774933}" type="datetimeFigureOut">
               <a:rPr lang="zh-CN" altLang="en-US" smtClean="0"/>
-              <a:t>2024/9/15</a:t>
+              <a:t>2024/9/6</a:t>
             </a:fld>
             <a:endParaRPr lang="zh-CN" altLang="en-US"/>
           </a:p>
@@ -2916,7 +2915,7 @@
           <a:p>
             <a:fld id="{58A749B2-B91D-4C1A-83E6-7AD02F774933}" type="datetimeFigureOut">
               <a:rPr lang="zh-CN" altLang="en-US" smtClean="0"/>
-              <a:t>2024/9/15</a:t>
+              <a:t>2024/9/6</a:t>
             </a:fld>
             <a:endParaRPr lang="zh-CN" altLang="en-US"/>
           </a:p>
@@ -3638,10 +3637,10 @@
       </p:grpSpPr>
       <p:pic>
         <p:nvPicPr>
-          <p:cNvPr id="7" name="图片 6">
-            <a:extLst>
-              <a:ext uri="{FF2B5EF4-FFF2-40B4-BE49-F238E27FC236}">
-                <a16:creationId xmlns:a16="http://schemas.microsoft.com/office/drawing/2014/main" id="{520DBDDE-D7E8-649F-FF74-C5F836B2177A}"/>
+          <p:cNvPr id="2" name="图片 1">
+            <a:extLst>
+              <a:ext uri="{FF2B5EF4-FFF2-40B4-BE49-F238E27FC236}">
+                <a16:creationId xmlns:a16="http://schemas.microsoft.com/office/drawing/2014/main" id="{18307BB2-8510-23D6-2FF7-2913C9E5358A}"/>
               </a:ext>
             </a:extLst>
           </p:cNvPr>
@@ -3651,27 +3650,105 @@
           <p:nvPr/>
         </p:nvPicPr>
         <p:blipFill>
-          <a:blip r:embed="rId2"/>
+          <a:blip r:embed="rId2">
+            <a:extLst>
+              <a:ext uri="{28A0092B-C50C-407E-A947-70E740481C1C}">
+                <a14:useLocalDpi xmlns:a14="http://schemas.microsoft.com/office/drawing/2010/main" val="0"/>
+              </a:ext>
+            </a:extLst>
+          </a:blip>
           <a:stretch>
             <a:fillRect/>
           </a:stretch>
         </p:blipFill>
         <p:spPr>
           <a:xfrm>
-            <a:off x="1606859" y="796510"/>
-            <a:ext cx="10604325" cy="5644750"/>
+            <a:off x="1846291" y="859157"/>
+            <a:ext cx="5581385" cy="3139529"/>
+          </a:xfrm>
+          <a:prstGeom prst="rect">
+            <a:avLst/>
+          </a:prstGeom>
+          <a:effectLst>
+            <a:reflection endPos="0" dist="50800" dir="5400000" sy="-100000" algn="bl" rotWithShape="0"/>
+          </a:effectLst>
+        </p:spPr>
+      </p:pic>
+      <p:pic>
+        <p:nvPicPr>
+          <p:cNvPr id="3" name="图片 2">
+            <a:extLst>
+              <a:ext uri="{FF2B5EF4-FFF2-40B4-BE49-F238E27FC236}">
+                <a16:creationId xmlns:a16="http://schemas.microsoft.com/office/drawing/2014/main" id="{5F39A048-5F64-38B5-51DA-55E7151EC42B}"/>
+              </a:ext>
+            </a:extLst>
+          </p:cNvPr>
+          <p:cNvPicPr>
+            <a:picLocks noChangeAspect="1"/>
+          </p:cNvPicPr>
+          <p:nvPr/>
+        </p:nvPicPr>
+        <p:blipFill>
+          <a:blip r:embed="rId3"/>
+          <a:stretch>
+            <a:fillRect/>
+          </a:stretch>
+        </p:blipFill>
+        <p:spPr>
+          <a:xfrm>
+            <a:off x="8263045" y="1829135"/>
+            <a:ext cx="1471623" cy="1414473"/>
           </a:xfrm>
           <a:prstGeom prst="rect">
             <a:avLst/>
           </a:prstGeom>
         </p:spPr>
       </p:pic>
+      <p:pic>
+        <p:nvPicPr>
+          <p:cNvPr id="4" name="图片 3">
+            <a:extLst>
+              <a:ext uri="{FF2B5EF4-FFF2-40B4-BE49-F238E27FC236}">
+                <a16:creationId xmlns:a16="http://schemas.microsoft.com/office/drawing/2014/main" id="{3E0C5581-ED1C-5AE7-071F-E94B7AB69402}"/>
+              </a:ext>
+            </a:extLst>
+          </p:cNvPr>
+          <p:cNvPicPr>
+            <a:picLocks noChangeAspect="1"/>
+          </p:cNvPicPr>
+          <p:nvPr/>
+        </p:nvPicPr>
+        <p:blipFill>
+          <a:blip r:embed="rId2">
+            <a:extLst>
+              <a:ext uri="{28A0092B-C50C-407E-A947-70E740481C1C}">
+                <a14:useLocalDpi xmlns:a14="http://schemas.microsoft.com/office/drawing/2010/main" val="0"/>
+              </a:ext>
+            </a:extLst>
+          </a:blip>
+          <a:stretch>
+            <a:fillRect/>
+          </a:stretch>
+        </p:blipFill>
+        <p:spPr>
+          <a:xfrm>
+            <a:off x="176330" y="3206996"/>
+            <a:ext cx="7106672" cy="3743181"/>
+          </a:xfrm>
+          <a:prstGeom prst="rect">
+            <a:avLst/>
+          </a:prstGeom>
+          <a:effectLst>
+            <a:reflection endPos="0" dist="50800" dir="5400000" sy="-100000" algn="bl" rotWithShape="0"/>
+          </a:effectLst>
+        </p:spPr>
+      </p:pic>
       <p:sp>
         <p:nvSpPr>
           <p:cNvPr id="6" name="矩形 5">
             <a:extLst>
               <a:ext uri="{FF2B5EF4-FFF2-40B4-BE49-F238E27FC236}">
-                <a16:creationId xmlns:a16="http://schemas.microsoft.com/office/drawing/2014/main" id="{F8776CA8-79BB-FE08-20A9-904F0BDB5D5C}"/>
+                <a16:creationId xmlns:a16="http://schemas.microsoft.com/office/drawing/2014/main" id="{4E58FB89-5202-0383-E3B9-99B492940378}"/>
               </a:ext>
             </a:extLst>
           </p:cNvPr>
@@ -3680,8 +3757,8 @@
         </p:nvSpPr>
         <p:spPr>
           <a:xfrm>
-            <a:off x="3459373" y="1717856"/>
-            <a:ext cx="8193157" cy="1446550"/>
+            <a:off x="1998691" y="1173195"/>
+            <a:ext cx="2313454" cy="2646878"/>
           </a:xfrm>
           <a:prstGeom prst="rect">
             <a:avLst/>
@@ -3689,14 +3766,14 @@
           <a:noFill/>
         </p:spPr>
         <p:txBody>
-          <a:bodyPr wrap="square" lIns="91440" tIns="45720" rIns="91440" bIns="45720">
+          <a:bodyPr wrap="none" lIns="91440" tIns="45720" rIns="91440" bIns="45720">
             <a:spAutoFit/>
           </a:bodyPr>
           <a:lstStyle/>
           <a:p>
             <a:pPr algn="ctr"/>
             <a:r>
-              <a:rPr lang="zh-CN" altLang="en-US" sz="8800" b="0" cap="none" spc="0" dirty="0">
+              <a:rPr lang="zh-CN" altLang="en-US" sz="16600" dirty="0">
                 <a:ln w="0"/>
                 <a:solidFill>
                   <a:schemeClr val="bg1"/>
@@ -3708,18 +3785,98 @@
                     </a:schemeClr>
                   </a:outerShdw>
                 </a:effectLst>
-                <a:latin typeface="华文新魏" panose="02010800040101010101" pitchFamily="2" charset="-122"/>
-                <a:ea typeface="华文新魏" panose="02010800040101010101" pitchFamily="2" charset="-122"/>
+                <a:latin typeface="华文行楷" panose="02010800040101010101" pitchFamily="2" charset="-122"/>
+                <a:ea typeface="华文行楷" panose="02010800040101010101" pitchFamily="2" charset="-122"/>
               </a:rPr>
-              <a:t>惯导学习整理</a:t>
-            </a:r>
+              <a:t>汐</a:t>
+            </a:r>
+            <a:endParaRPr lang="zh-CN" altLang="en-US" sz="16600" b="0" cap="none" spc="0" dirty="0">
+              <a:ln w="0"/>
+              <a:solidFill>
+                <a:schemeClr val="bg1"/>
+              </a:solidFill>
+              <a:effectLst>
+                <a:outerShdw blurRad="38100" dist="19050" dir="2700000" algn="tl" rotWithShape="0">
+                  <a:schemeClr val="dk1">
+                    <a:alpha val="40000"/>
+                  </a:schemeClr>
+                </a:outerShdw>
+              </a:effectLst>
+              <a:latin typeface="华文行楷" panose="02010800040101010101" pitchFamily="2" charset="-122"/>
+              <a:ea typeface="华文行楷" panose="02010800040101010101" pitchFamily="2" charset="-122"/>
+            </a:endParaRPr>
+          </a:p>
+        </p:txBody>
+      </p:sp>
+      <p:sp>
+        <p:nvSpPr>
+          <p:cNvPr id="7" name="矩形 6">
+            <a:extLst>
+              <a:ext uri="{FF2B5EF4-FFF2-40B4-BE49-F238E27FC236}">
+                <a16:creationId xmlns:a16="http://schemas.microsoft.com/office/drawing/2014/main" id="{9DFC419B-8D50-3186-7E8A-B82DF77C24C2}"/>
+              </a:ext>
+            </a:extLst>
+          </p:cNvPr>
+          <p:cNvSpPr/>
+          <p:nvPr/>
+        </p:nvSpPr>
+        <p:spPr>
+          <a:xfrm>
+            <a:off x="31656" y="3755147"/>
+            <a:ext cx="7109639" cy="1015663"/>
+          </a:xfrm>
+          <a:prstGeom prst="rect">
+            <a:avLst/>
+          </a:prstGeom>
+          <a:noFill/>
+        </p:spPr>
+        <p:txBody>
+          <a:bodyPr wrap="none" lIns="91440" tIns="45720" rIns="91440" bIns="45720">
+            <a:spAutoFit/>
+          </a:bodyPr>
+          <a:lstStyle/>
+          <a:p>
+            <a:pPr algn="ctr"/>
+            <a:r>
+              <a:rPr lang="zh-CN" altLang="en-US" sz="6000" dirty="0">
+                <a:ln w="0"/>
+                <a:solidFill>
+                  <a:schemeClr val="bg1"/>
+                </a:solidFill>
+                <a:effectLst>
+                  <a:outerShdw blurRad="38100" dist="19050" dir="2700000" algn="tl" rotWithShape="0">
+                    <a:schemeClr val="dk1">
+                      <a:alpha val="40000"/>
+                    </a:schemeClr>
+                  </a:outerShdw>
+                </a:effectLst>
+                <a:latin typeface="华文行楷" panose="02010800040101010101" pitchFamily="2" charset="-122"/>
+                <a:ea typeface="华文行楷" panose="02010800040101010101" pitchFamily="2" charset="-122"/>
+              </a:rPr>
+              <a:t>因子图优化相关问题</a:t>
+            </a:r>
+            <a:endParaRPr lang="zh-CN" altLang="en-US" sz="6000" b="0" cap="none" spc="0" dirty="0">
+              <a:ln w="0"/>
+              <a:solidFill>
+                <a:schemeClr val="bg1"/>
+              </a:solidFill>
+              <a:effectLst>
+                <a:outerShdw blurRad="38100" dist="19050" dir="2700000" algn="tl" rotWithShape="0">
+                  <a:schemeClr val="dk1">
+                    <a:alpha val="40000"/>
+                  </a:schemeClr>
+                </a:outerShdw>
+              </a:effectLst>
+              <a:latin typeface="华文行楷" panose="02010800040101010101" pitchFamily="2" charset="-122"/>
+              <a:ea typeface="华文行楷" panose="02010800040101010101" pitchFamily="2" charset="-122"/>
+            </a:endParaRPr>
           </a:p>
         </p:txBody>
       </p:sp>
     </p:spTree>
     <p:extLst>
       <p:ext uri="{BB962C8B-B14F-4D97-AF65-F5344CB8AC3E}">
-        <p14:creationId xmlns:p14="http://schemas.microsoft.com/office/powerpoint/2010/main" val="2595486900"/>
+        <p14:creationId xmlns:p14="http://schemas.microsoft.com/office/powerpoint/2010/main" val="1162833254"/>
       </p:ext>
     </p:extLst>
   </p:cSld>
@@ -3774,7 +3931,7 @@
         </p:blipFill>
         <p:spPr>
           <a:xfrm>
-            <a:off x="1846291" y="859157"/>
+            <a:off x="1649691" y="966606"/>
             <a:ext cx="5581385" cy="3139529"/>
           </a:xfrm>
           <a:prstGeom prst="rect">
@@ -3843,7 +4000,7 @@
         </p:blipFill>
         <p:spPr>
           <a:xfrm>
-            <a:off x="176330" y="3206996"/>
+            <a:off x="1074418" y="4372206"/>
             <a:ext cx="7106672" cy="3743181"/>
           </a:xfrm>
           <a:prstGeom prst="rect">
@@ -3868,8 +4025,8 @@
         </p:nvSpPr>
         <p:spPr>
           <a:xfrm>
-            <a:off x="1998691" y="1173195"/>
-            <a:ext cx="2313454" cy="2646878"/>
+            <a:off x="7320557" y="2132671"/>
+            <a:ext cx="5032148" cy="1569660"/>
           </a:xfrm>
           <a:prstGeom prst="rect">
             <a:avLst/>
@@ -3884,7 +4041,7 @@
           <a:p>
             <a:pPr algn="ctr"/>
             <a:r>
-              <a:rPr lang="zh-CN" altLang="en-US" sz="16600" dirty="0">
+              <a:rPr lang="en-US" altLang="zh-CN" sz="9600" dirty="0">
                 <a:ln w="0"/>
                 <a:solidFill>
                   <a:schemeClr val="bg1"/>
@@ -3899,9 +4056,27 @@
                 <a:latin typeface="华文行楷" panose="02010800040101010101" pitchFamily="2" charset="-122"/>
                 <a:ea typeface="华文行楷" panose="02010800040101010101" pitchFamily="2" charset="-122"/>
               </a:rPr>
-              <a:t>汐</a:t>
-            </a:r>
-            <a:endParaRPr lang="zh-CN" altLang="en-US" sz="16600" b="0" cap="none" spc="0" dirty="0">
+              <a:t>C++</a:t>
+            </a:r>
+            <a:r>
+              <a:rPr lang="zh-CN" altLang="en-US" sz="9600" dirty="0">
+                <a:ln w="0"/>
+                <a:solidFill>
+                  <a:schemeClr val="bg1"/>
+                </a:solidFill>
+                <a:effectLst>
+                  <a:outerShdw blurRad="38100" dist="19050" dir="2700000" algn="tl" rotWithShape="0">
+                    <a:schemeClr val="dk1">
+                      <a:alpha val="40000"/>
+                    </a:schemeClr>
+                  </a:outerShdw>
+                </a:effectLst>
+                <a:latin typeface="华文行楷" panose="02010800040101010101" pitchFamily="2" charset="-122"/>
+                <a:ea typeface="华文行楷" panose="02010800040101010101" pitchFamily="2" charset="-122"/>
+              </a:rPr>
+              <a:t>学习</a:t>
+            </a:r>
+            <a:endParaRPr lang="zh-CN" altLang="en-US" sz="9600" b="0" cap="none" spc="0" dirty="0">
               <a:ln w="0"/>
               <a:solidFill>
                 <a:schemeClr val="bg1"/>
@@ -3933,7 +4108,7 @@
         </p:nvSpPr>
         <p:spPr>
           <a:xfrm>
-            <a:off x="31656" y="3755147"/>
+            <a:off x="971814" y="4727097"/>
             <a:ext cx="7109639" cy="1015663"/>
           </a:xfrm>
           <a:prstGeom prst="rect">
@@ -3984,10 +4159,123 @@
           </a:p>
         </p:txBody>
       </p:sp>
+      <p:pic>
+        <p:nvPicPr>
+          <p:cNvPr id="5" name="图片 4">
+            <a:extLst>
+              <a:ext uri="{FF2B5EF4-FFF2-40B4-BE49-F238E27FC236}">
+                <a16:creationId xmlns:a16="http://schemas.microsoft.com/office/drawing/2014/main" id="{6176AF20-7AED-6942-370D-59501BBD8954}"/>
+              </a:ext>
+            </a:extLst>
+          </p:cNvPr>
+          <p:cNvPicPr>
+            <a:picLocks noChangeAspect="1"/>
+          </p:cNvPicPr>
+          <p:nvPr/>
+        </p:nvPicPr>
+        <p:blipFill>
+          <a:blip r:embed="rId4"/>
+          <a:stretch>
+            <a:fillRect/>
+          </a:stretch>
+        </p:blipFill>
+        <p:spPr>
+          <a:xfrm>
+            <a:off x="1451725" y="1078270"/>
+            <a:ext cx="5295939" cy="3976717"/>
+          </a:xfrm>
+          <a:prstGeom prst="rect">
+            <a:avLst/>
+          </a:prstGeom>
+        </p:spPr>
+      </p:pic>
+      <p:sp>
+        <p:nvSpPr>
+          <p:cNvPr id="8" name="矩形 7">
+            <a:extLst>
+              <a:ext uri="{FF2B5EF4-FFF2-40B4-BE49-F238E27FC236}">
+                <a16:creationId xmlns:a16="http://schemas.microsoft.com/office/drawing/2014/main" id="{C1A0DEB2-34EA-3B5E-A988-CA7490DBF046}"/>
+              </a:ext>
+            </a:extLst>
+          </p:cNvPr>
+          <p:cNvSpPr/>
+          <p:nvPr/>
+        </p:nvSpPr>
+        <p:spPr>
+          <a:xfrm>
+            <a:off x="1935136" y="1999579"/>
+            <a:ext cx="5032148" cy="1569660"/>
+          </a:xfrm>
+          <a:prstGeom prst="rect">
+            <a:avLst/>
+          </a:prstGeom>
+          <a:noFill/>
+        </p:spPr>
+        <p:txBody>
+          <a:bodyPr wrap="none" lIns="91440" tIns="45720" rIns="91440" bIns="45720">
+            <a:spAutoFit/>
+          </a:bodyPr>
+          <a:lstStyle/>
+          <a:p>
+            <a:pPr algn="ctr"/>
+            <a:r>
+              <a:rPr lang="en-US" altLang="zh-CN" sz="9600" dirty="0">
+                <a:ln w="0"/>
+                <a:solidFill>
+                  <a:schemeClr val="bg1"/>
+                </a:solidFill>
+                <a:effectLst>
+                  <a:outerShdw blurRad="38100" dist="19050" dir="2700000" algn="tl" rotWithShape="0">
+                    <a:schemeClr val="dk1">
+                      <a:alpha val="40000"/>
+                    </a:schemeClr>
+                  </a:outerShdw>
+                </a:effectLst>
+                <a:latin typeface="华文行楷" panose="02010800040101010101" pitchFamily="2" charset="-122"/>
+                <a:ea typeface="华文行楷" panose="02010800040101010101" pitchFamily="2" charset="-122"/>
+              </a:rPr>
+              <a:t>C++</a:t>
+            </a:r>
+            <a:r>
+              <a:rPr lang="zh-CN" altLang="en-US" sz="9600" dirty="0">
+                <a:ln w="0"/>
+                <a:solidFill>
+                  <a:schemeClr val="bg1"/>
+                </a:solidFill>
+                <a:effectLst>
+                  <a:outerShdw blurRad="38100" dist="19050" dir="2700000" algn="tl" rotWithShape="0">
+                    <a:schemeClr val="dk1">
+                      <a:alpha val="40000"/>
+                    </a:schemeClr>
+                  </a:outerShdw>
+                </a:effectLst>
+                <a:latin typeface="华文行楷" panose="02010800040101010101" pitchFamily="2" charset="-122"/>
+                <a:ea typeface="华文行楷" panose="02010800040101010101" pitchFamily="2" charset="-122"/>
+              </a:rPr>
+              <a:t>学习</a:t>
+            </a:r>
+            <a:endParaRPr lang="zh-CN" altLang="en-US" sz="9600" b="0" cap="none" spc="0" dirty="0">
+              <a:ln w="0"/>
+              <a:solidFill>
+                <a:schemeClr val="bg1"/>
+              </a:solidFill>
+              <a:effectLst>
+                <a:outerShdw blurRad="38100" dist="19050" dir="2700000" algn="tl" rotWithShape="0">
+                  <a:schemeClr val="dk1">
+                    <a:alpha val="40000"/>
+                  </a:schemeClr>
+                </a:outerShdw>
+              </a:effectLst>
+              <a:latin typeface="华文行楷" panose="02010800040101010101" pitchFamily="2" charset="-122"/>
+              <a:ea typeface="华文行楷" panose="02010800040101010101" pitchFamily="2" charset="-122"/>
+            </a:endParaRPr>
+          </a:p>
+        </p:txBody>
+      </p:sp>
     </p:spTree>
     <p:extLst>
       <p:ext uri="{BB962C8B-B14F-4D97-AF65-F5344CB8AC3E}">
-        <p14:creationId xmlns:p14="http://schemas.microsoft.com/office/powerpoint/2010/main" val="1162833254"/>
+        <p14:creationId xmlns:p14="http://schemas.microsoft.com/office/powerpoint/2010/main" val="3818139286"/>
       </p:ext>
     </p:extLst>
   </p:cSld>
@@ -4016,10 +4304,10 @@
       </p:grpSpPr>
       <p:pic>
         <p:nvPicPr>
-          <p:cNvPr id="2" name="图片 1">
-            <a:extLst>
-              <a:ext uri="{FF2B5EF4-FFF2-40B4-BE49-F238E27FC236}">
-                <a16:creationId xmlns:a16="http://schemas.microsoft.com/office/drawing/2014/main" id="{18307BB2-8510-23D6-2FF7-2913C9E5358A}"/>
+          <p:cNvPr id="4" name="图片 3">
+            <a:extLst>
+              <a:ext uri="{FF2B5EF4-FFF2-40B4-BE49-F238E27FC236}">
+                <a16:creationId xmlns:a16="http://schemas.microsoft.com/office/drawing/2014/main" id="{1A782AC0-43C4-AC14-E7D9-02DC59E93AE1}"/>
               </a:ext>
             </a:extLst>
           </p:cNvPr>
@@ -4029,115 +4317,37 @@
           <p:nvPr/>
         </p:nvPicPr>
         <p:blipFill>
-          <a:blip r:embed="rId2">
-            <a:extLst>
-              <a:ext uri="{28A0092B-C50C-407E-A947-70E740481C1C}">
-                <a14:useLocalDpi xmlns:a14="http://schemas.microsoft.com/office/drawing/2010/main" val="0"/>
-              </a:ext>
-            </a:extLst>
-          </a:blip>
+          <a:blip r:embed="rId2"/>
           <a:stretch>
             <a:fillRect/>
           </a:stretch>
         </p:blipFill>
         <p:spPr>
           <a:xfrm>
-            <a:off x="1649691" y="966606"/>
-            <a:ext cx="5581385" cy="3139529"/>
-          </a:xfrm>
-          <a:prstGeom prst="rect">
-            <a:avLst/>
-          </a:prstGeom>
-          <a:effectLst>
-            <a:reflection endPos="0" dist="50800" dir="5400000" sy="-100000" algn="bl" rotWithShape="0"/>
-          </a:effectLst>
-        </p:spPr>
-      </p:pic>
-      <p:pic>
-        <p:nvPicPr>
-          <p:cNvPr id="3" name="图片 2">
-            <a:extLst>
-              <a:ext uri="{FF2B5EF4-FFF2-40B4-BE49-F238E27FC236}">
-                <a16:creationId xmlns:a16="http://schemas.microsoft.com/office/drawing/2014/main" id="{5F39A048-5F64-38B5-51DA-55E7151EC42B}"/>
-              </a:ext>
-            </a:extLst>
-          </p:cNvPr>
-          <p:cNvPicPr>
-            <a:picLocks noChangeAspect="1"/>
-          </p:cNvPicPr>
-          <p:nvPr/>
-        </p:nvPicPr>
-        <p:blipFill>
-          <a:blip r:embed="rId3"/>
-          <a:stretch>
-            <a:fillRect/>
-          </a:stretch>
-        </p:blipFill>
-        <p:spPr>
-          <a:xfrm>
-            <a:off x="8263045" y="1829135"/>
-            <a:ext cx="1471623" cy="1414473"/>
+            <a:off x="2509213" y="1199565"/>
+            <a:ext cx="6634786" cy="4878180"/>
           </a:xfrm>
           <a:prstGeom prst="rect">
             <a:avLst/>
           </a:prstGeom>
         </p:spPr>
       </p:pic>
-      <p:pic>
-        <p:nvPicPr>
-          <p:cNvPr id="4" name="图片 3">
-            <a:extLst>
-              <a:ext uri="{FF2B5EF4-FFF2-40B4-BE49-F238E27FC236}">
-                <a16:creationId xmlns:a16="http://schemas.microsoft.com/office/drawing/2014/main" id="{3E0C5581-ED1C-5AE7-071F-E94B7AB69402}"/>
-              </a:ext>
-            </a:extLst>
-          </p:cNvPr>
-          <p:cNvPicPr>
-            <a:picLocks noChangeAspect="1"/>
-          </p:cNvPicPr>
+      <p:sp>
+        <p:nvSpPr>
+          <p:cNvPr id="5" name="矩形 4">
+            <a:extLst>
+              <a:ext uri="{FF2B5EF4-FFF2-40B4-BE49-F238E27FC236}">
+                <a16:creationId xmlns:a16="http://schemas.microsoft.com/office/drawing/2014/main" id="{5133D3C1-5EC9-B360-36E9-0F29F16A3DD9}"/>
+              </a:ext>
+            </a:extLst>
+          </p:cNvPr>
+          <p:cNvSpPr/>
           <p:nvPr/>
-        </p:nvPicPr>
-        <p:blipFill>
-          <a:blip r:embed="rId2">
-            <a:extLst>
-              <a:ext uri="{28A0092B-C50C-407E-A947-70E740481C1C}">
-                <a14:useLocalDpi xmlns:a14="http://schemas.microsoft.com/office/drawing/2010/main" val="0"/>
-              </a:ext>
-            </a:extLst>
-          </a:blip>
-          <a:stretch>
-            <a:fillRect/>
-          </a:stretch>
-        </p:blipFill>
+        </p:nvSpPr>
         <p:spPr>
           <a:xfrm>
-            <a:off x="1074418" y="4372206"/>
-            <a:ext cx="7106672" cy="3743181"/>
-          </a:xfrm>
-          <a:prstGeom prst="rect">
-            <a:avLst/>
-          </a:prstGeom>
-          <a:effectLst>
-            <a:reflection endPos="0" dist="50800" dir="5400000" sy="-100000" algn="bl" rotWithShape="0"/>
-          </a:effectLst>
-        </p:spPr>
-      </p:pic>
-      <p:sp>
-        <p:nvSpPr>
-          <p:cNvPr id="6" name="矩形 5">
-            <a:extLst>
-              <a:ext uri="{FF2B5EF4-FFF2-40B4-BE49-F238E27FC236}">
-                <a16:creationId xmlns:a16="http://schemas.microsoft.com/office/drawing/2014/main" id="{4E58FB89-5202-0383-E3B9-99B492940378}"/>
-              </a:ext>
-            </a:extLst>
-          </p:cNvPr>
-          <p:cNvSpPr/>
-          <p:nvPr/>
-        </p:nvSpPr>
-        <p:spPr>
-          <a:xfrm>
-            <a:off x="7320557" y="2132671"/>
-            <a:ext cx="5032148" cy="1569660"/>
+            <a:off x="5158105" y="4042721"/>
+            <a:ext cx="2262158" cy="923330"/>
           </a:xfrm>
           <a:prstGeom prst="rect">
             <a:avLst/>
@@ -4152,10 +4362,10 @@
           <a:p>
             <a:pPr algn="ctr"/>
             <a:r>
-              <a:rPr lang="en-US" altLang="zh-CN" sz="9600" dirty="0">
+              <a:rPr lang="zh-CN" altLang="en-US" sz="5400" b="0" cap="none" spc="0" dirty="0">
                 <a:ln w="0"/>
                 <a:solidFill>
-                  <a:schemeClr val="bg1"/>
+                  <a:schemeClr val="tx1"/>
                 </a:solidFill>
                 <a:effectLst>
                   <a:outerShdw blurRad="38100" dist="19050" dir="2700000" algn="tl" rotWithShape="0">
@@ -4167,226 +4377,15 @@
                 <a:latin typeface="华文行楷" panose="02010800040101010101" pitchFamily="2" charset="-122"/>
                 <a:ea typeface="华文行楷" panose="02010800040101010101" pitchFamily="2" charset="-122"/>
               </a:rPr>
-              <a:t>C++</a:t>
-            </a:r>
-            <a:r>
-              <a:rPr lang="zh-CN" altLang="en-US" sz="9600" dirty="0">
-                <a:ln w="0"/>
-                <a:solidFill>
-                  <a:schemeClr val="bg1"/>
-                </a:solidFill>
-                <a:effectLst>
-                  <a:outerShdw blurRad="38100" dist="19050" dir="2700000" algn="tl" rotWithShape="0">
-                    <a:schemeClr val="dk1">
-                      <a:alpha val="40000"/>
-                    </a:schemeClr>
-                  </a:outerShdw>
-                </a:effectLst>
-                <a:latin typeface="华文行楷" panose="02010800040101010101" pitchFamily="2" charset="-122"/>
-                <a:ea typeface="华文行楷" panose="02010800040101010101" pitchFamily="2" charset="-122"/>
-              </a:rPr>
-              <a:t>学习</a:t>
-            </a:r>
-            <a:endParaRPr lang="zh-CN" altLang="en-US" sz="9600" b="0" cap="none" spc="0" dirty="0">
-              <a:ln w="0"/>
-              <a:solidFill>
-                <a:schemeClr val="bg1"/>
-              </a:solidFill>
-              <a:effectLst>
-                <a:outerShdw blurRad="38100" dist="19050" dir="2700000" algn="tl" rotWithShape="0">
-                  <a:schemeClr val="dk1">
-                    <a:alpha val="40000"/>
-                  </a:schemeClr>
-                </a:outerShdw>
-              </a:effectLst>
-              <a:latin typeface="华文行楷" panose="02010800040101010101" pitchFamily="2" charset="-122"/>
-              <a:ea typeface="华文行楷" panose="02010800040101010101" pitchFamily="2" charset="-122"/>
-            </a:endParaRPr>
-          </a:p>
-        </p:txBody>
-      </p:sp>
-      <p:sp>
-        <p:nvSpPr>
-          <p:cNvPr id="7" name="矩形 6">
-            <a:extLst>
-              <a:ext uri="{FF2B5EF4-FFF2-40B4-BE49-F238E27FC236}">
-                <a16:creationId xmlns:a16="http://schemas.microsoft.com/office/drawing/2014/main" id="{9DFC419B-8D50-3186-7E8A-B82DF77C24C2}"/>
-              </a:ext>
-            </a:extLst>
-          </p:cNvPr>
-          <p:cNvSpPr/>
-          <p:nvPr/>
-        </p:nvSpPr>
-        <p:spPr>
-          <a:xfrm>
-            <a:off x="971814" y="4727097"/>
-            <a:ext cx="7109639" cy="1015663"/>
-          </a:xfrm>
-          <a:prstGeom prst="rect">
-            <a:avLst/>
-          </a:prstGeom>
-          <a:noFill/>
-        </p:spPr>
-        <p:txBody>
-          <a:bodyPr wrap="none" lIns="91440" tIns="45720" rIns="91440" bIns="45720">
-            <a:spAutoFit/>
-          </a:bodyPr>
-          <a:lstStyle/>
-          <a:p>
-            <a:pPr algn="ctr"/>
-            <a:r>
-              <a:rPr lang="zh-CN" altLang="en-US" sz="6000" dirty="0">
-                <a:ln w="0"/>
-                <a:solidFill>
-                  <a:schemeClr val="bg1"/>
-                </a:solidFill>
-                <a:effectLst>
-                  <a:outerShdw blurRad="38100" dist="19050" dir="2700000" algn="tl" rotWithShape="0">
-                    <a:schemeClr val="dk1">
-                      <a:alpha val="40000"/>
-                    </a:schemeClr>
-                  </a:outerShdw>
-                </a:effectLst>
-                <a:latin typeface="华文行楷" panose="02010800040101010101" pitchFamily="2" charset="-122"/>
-                <a:ea typeface="华文行楷" panose="02010800040101010101" pitchFamily="2" charset="-122"/>
-              </a:rPr>
-              <a:t>因子图优化相关问题</a:t>
-            </a:r>
-            <a:endParaRPr lang="zh-CN" altLang="en-US" sz="6000" b="0" cap="none" spc="0" dirty="0">
-              <a:ln w="0"/>
-              <a:solidFill>
-                <a:schemeClr val="bg1"/>
-              </a:solidFill>
-              <a:effectLst>
-                <a:outerShdw blurRad="38100" dist="19050" dir="2700000" algn="tl" rotWithShape="0">
-                  <a:schemeClr val="dk1">
-                    <a:alpha val="40000"/>
-                  </a:schemeClr>
-                </a:outerShdw>
-              </a:effectLst>
-              <a:latin typeface="华文行楷" panose="02010800040101010101" pitchFamily="2" charset="-122"/>
-              <a:ea typeface="华文行楷" panose="02010800040101010101" pitchFamily="2" charset="-122"/>
-            </a:endParaRPr>
-          </a:p>
-        </p:txBody>
-      </p:sp>
-      <p:pic>
-        <p:nvPicPr>
-          <p:cNvPr id="5" name="图片 4">
-            <a:extLst>
-              <a:ext uri="{FF2B5EF4-FFF2-40B4-BE49-F238E27FC236}">
-                <a16:creationId xmlns:a16="http://schemas.microsoft.com/office/drawing/2014/main" id="{6176AF20-7AED-6942-370D-59501BBD8954}"/>
-              </a:ext>
-            </a:extLst>
-          </p:cNvPr>
-          <p:cNvPicPr>
-            <a:picLocks noChangeAspect="1"/>
-          </p:cNvPicPr>
-          <p:nvPr/>
-        </p:nvPicPr>
-        <p:blipFill>
-          <a:blip r:embed="rId4"/>
-          <a:stretch>
-            <a:fillRect/>
-          </a:stretch>
-        </p:blipFill>
-        <p:spPr>
-          <a:xfrm>
-            <a:off x="1451725" y="1078270"/>
-            <a:ext cx="5295939" cy="3976717"/>
-          </a:xfrm>
-          <a:prstGeom prst="rect">
-            <a:avLst/>
-          </a:prstGeom>
-        </p:spPr>
-      </p:pic>
-      <p:sp>
-        <p:nvSpPr>
-          <p:cNvPr id="8" name="矩形 7">
-            <a:extLst>
-              <a:ext uri="{FF2B5EF4-FFF2-40B4-BE49-F238E27FC236}">
-                <a16:creationId xmlns:a16="http://schemas.microsoft.com/office/drawing/2014/main" id="{C1A0DEB2-34EA-3B5E-A988-CA7490DBF046}"/>
-              </a:ext>
-            </a:extLst>
-          </p:cNvPr>
-          <p:cNvSpPr/>
-          <p:nvPr/>
-        </p:nvSpPr>
-        <p:spPr>
-          <a:xfrm>
-            <a:off x="1935136" y="1999579"/>
-            <a:ext cx="5032148" cy="1569660"/>
-          </a:xfrm>
-          <a:prstGeom prst="rect">
-            <a:avLst/>
-          </a:prstGeom>
-          <a:noFill/>
-        </p:spPr>
-        <p:txBody>
-          <a:bodyPr wrap="none" lIns="91440" tIns="45720" rIns="91440" bIns="45720">
-            <a:spAutoFit/>
-          </a:bodyPr>
-          <a:lstStyle/>
-          <a:p>
-            <a:pPr algn="ctr"/>
-            <a:r>
-              <a:rPr lang="en-US" altLang="zh-CN" sz="9600" dirty="0">
-                <a:ln w="0"/>
-                <a:solidFill>
-                  <a:schemeClr val="bg1"/>
-                </a:solidFill>
-                <a:effectLst>
-                  <a:outerShdw blurRad="38100" dist="19050" dir="2700000" algn="tl" rotWithShape="0">
-                    <a:schemeClr val="dk1">
-                      <a:alpha val="40000"/>
-                    </a:schemeClr>
-                  </a:outerShdw>
-                </a:effectLst>
-                <a:latin typeface="华文行楷" panose="02010800040101010101" pitchFamily="2" charset="-122"/>
-                <a:ea typeface="华文行楷" panose="02010800040101010101" pitchFamily="2" charset="-122"/>
-              </a:rPr>
-              <a:t>C++</a:t>
-            </a:r>
-            <a:r>
-              <a:rPr lang="zh-CN" altLang="en-US" sz="9600" dirty="0">
-                <a:ln w="0"/>
-                <a:solidFill>
-                  <a:schemeClr val="bg1"/>
-                </a:solidFill>
-                <a:effectLst>
-                  <a:outerShdw blurRad="38100" dist="19050" dir="2700000" algn="tl" rotWithShape="0">
-                    <a:schemeClr val="dk1">
-                      <a:alpha val="40000"/>
-                    </a:schemeClr>
-                  </a:outerShdw>
-                </a:effectLst>
-                <a:latin typeface="华文行楷" panose="02010800040101010101" pitchFamily="2" charset="-122"/>
-                <a:ea typeface="华文行楷" panose="02010800040101010101" pitchFamily="2" charset="-122"/>
-              </a:rPr>
-              <a:t>学习</a:t>
-            </a:r>
-            <a:endParaRPr lang="zh-CN" altLang="en-US" sz="9600" b="0" cap="none" spc="0" dirty="0">
-              <a:ln w="0"/>
-              <a:solidFill>
-                <a:schemeClr val="bg1"/>
-              </a:solidFill>
-              <a:effectLst>
-                <a:outerShdw blurRad="38100" dist="19050" dir="2700000" algn="tl" rotWithShape="0">
-                  <a:schemeClr val="dk1">
-                    <a:alpha val="40000"/>
-                  </a:schemeClr>
-                </a:outerShdw>
-              </a:effectLst>
-              <a:latin typeface="华文行楷" panose="02010800040101010101" pitchFamily="2" charset="-122"/>
-              <a:ea typeface="华文行楷" panose="02010800040101010101" pitchFamily="2" charset="-122"/>
-            </a:endParaRPr>
+              <a:t>碎碎念</a:t>
+            </a:r>
           </a:p>
         </p:txBody>
       </p:sp>
     </p:spTree>
     <p:extLst>
       <p:ext uri="{BB962C8B-B14F-4D97-AF65-F5344CB8AC3E}">
-        <p14:creationId xmlns:p14="http://schemas.microsoft.com/office/powerpoint/2010/main" val="3818139286"/>
+        <p14:creationId xmlns:p14="http://schemas.microsoft.com/office/powerpoint/2010/main" val="3264562608"/>
       </p:ext>
     </p:extLst>
   </p:cSld>
@@ -4415,116 +4414,6 @@
       </p:grpSpPr>
       <p:pic>
         <p:nvPicPr>
-          <p:cNvPr id="4" name="图片 3">
-            <a:extLst>
-              <a:ext uri="{FF2B5EF4-FFF2-40B4-BE49-F238E27FC236}">
-                <a16:creationId xmlns:a16="http://schemas.microsoft.com/office/drawing/2014/main" id="{1A782AC0-43C4-AC14-E7D9-02DC59E93AE1}"/>
-              </a:ext>
-            </a:extLst>
-          </p:cNvPr>
-          <p:cNvPicPr>
-            <a:picLocks noChangeAspect="1"/>
-          </p:cNvPicPr>
-          <p:nvPr/>
-        </p:nvPicPr>
-        <p:blipFill>
-          <a:blip r:embed="rId2"/>
-          <a:stretch>
-            <a:fillRect/>
-          </a:stretch>
-        </p:blipFill>
-        <p:spPr>
-          <a:xfrm>
-            <a:off x="2509213" y="1199565"/>
-            <a:ext cx="6634786" cy="4878180"/>
-          </a:xfrm>
-          <a:prstGeom prst="rect">
-            <a:avLst/>
-          </a:prstGeom>
-        </p:spPr>
-      </p:pic>
-      <p:sp>
-        <p:nvSpPr>
-          <p:cNvPr id="5" name="矩形 4">
-            <a:extLst>
-              <a:ext uri="{FF2B5EF4-FFF2-40B4-BE49-F238E27FC236}">
-                <a16:creationId xmlns:a16="http://schemas.microsoft.com/office/drawing/2014/main" id="{5133D3C1-5EC9-B360-36E9-0F29F16A3DD9}"/>
-              </a:ext>
-            </a:extLst>
-          </p:cNvPr>
-          <p:cNvSpPr/>
-          <p:nvPr/>
-        </p:nvSpPr>
-        <p:spPr>
-          <a:xfrm>
-            <a:off x="5158105" y="4042721"/>
-            <a:ext cx="2262158" cy="923330"/>
-          </a:xfrm>
-          <a:prstGeom prst="rect">
-            <a:avLst/>
-          </a:prstGeom>
-          <a:noFill/>
-        </p:spPr>
-        <p:txBody>
-          <a:bodyPr wrap="none" lIns="91440" tIns="45720" rIns="91440" bIns="45720">
-            <a:spAutoFit/>
-          </a:bodyPr>
-          <a:lstStyle/>
-          <a:p>
-            <a:pPr algn="ctr"/>
-            <a:r>
-              <a:rPr lang="zh-CN" altLang="en-US" sz="5400" b="0" cap="none" spc="0" dirty="0">
-                <a:ln w="0"/>
-                <a:solidFill>
-                  <a:schemeClr val="tx1"/>
-                </a:solidFill>
-                <a:effectLst>
-                  <a:outerShdw blurRad="38100" dist="19050" dir="2700000" algn="tl" rotWithShape="0">
-                    <a:schemeClr val="dk1">
-                      <a:alpha val="40000"/>
-                    </a:schemeClr>
-                  </a:outerShdw>
-                </a:effectLst>
-                <a:latin typeface="华文行楷" panose="02010800040101010101" pitchFamily="2" charset="-122"/>
-                <a:ea typeface="华文行楷" panose="02010800040101010101" pitchFamily="2" charset="-122"/>
-              </a:rPr>
-              <a:t>碎碎念</a:t>
-            </a:r>
-          </a:p>
-        </p:txBody>
-      </p:sp>
-    </p:spTree>
-    <p:extLst>
-      <p:ext uri="{BB962C8B-B14F-4D97-AF65-F5344CB8AC3E}">
-        <p14:creationId xmlns:p14="http://schemas.microsoft.com/office/powerpoint/2010/main" val="3264562608"/>
-      </p:ext>
-    </p:extLst>
-  </p:cSld>
-  <p:clrMapOvr>
-    <a:masterClrMapping/>
-  </p:clrMapOvr>
-</p:sld>
-</file>
-
-<file path=ppt/slides/slide7.xml><?xml version="1.0" encoding="utf-8"?>
-<p:sld xmlns:a="http://schemas.openxmlformats.org/drawingml/2006/main" xmlns:r="http://schemas.openxmlformats.org/officeDocument/2006/relationships" xmlns:p="http://schemas.openxmlformats.org/presentationml/2006/main">
-  <p:cSld>
-    <p:spTree>
-      <p:nvGrpSpPr>
-        <p:cNvPr id="1" name=""/>
-        <p:cNvGrpSpPr/>
-        <p:nvPr/>
-      </p:nvGrpSpPr>
-      <p:grpSpPr>
-        <a:xfrm>
-          <a:off x="0" y="0"/>
-          <a:ext cx="0" cy="0"/>
-          <a:chOff x="0" y="0"/>
-          <a:chExt cx="0" cy="0"/>
-        </a:xfrm>
-      </p:grpSpPr>
-      <p:pic>
-        <p:nvPicPr>
           <p:cNvPr id="2" name="图片 1">
             <a:extLst>
               <a:ext uri="{FF2B5EF4-FFF2-40B4-BE49-F238E27FC236}">
@@ -4616,7 +4505,7 @@
 </p:sld>
 </file>
 
-<file path=ppt/slides/slide8.xml><?xml version="1.0" encoding="utf-8"?>
+<file path=ppt/slides/slide7.xml><?xml version="1.0" encoding="utf-8"?>
 <p:sld xmlns:a="http://schemas.openxmlformats.org/drawingml/2006/main" xmlns:r="http://schemas.openxmlformats.org/officeDocument/2006/relationships" xmlns:p="http://schemas.openxmlformats.org/presentationml/2006/main">
   <p:cSld>
     <p:spTree>

</xml_diff>